<commit_message>
Update Face Recognition PPT with detailed content from LaTeX report
Co-authored-by: wuzhi456 <217564920+wuzhi456@users.noreply.github.com>
</commit_message>
<xml_diff>
--- a/Face_Recognition_Presentation.pptx
+++ b/Face_Recognition_Presentation.pptx
@@ -20,6 +20,12 @@
     <p:sldId id="268" r:id="rId19"/>
     <p:sldId id="269" r:id="rId20"/>
     <p:sldId id="270" r:id="rId21"/>
+    <p:sldId id="271" r:id="rId22"/>
+    <p:sldId id="272" r:id="rId23"/>
+    <p:sldId id="273" r:id="rId24"/>
+    <p:sldId id="274" r:id="rId25"/>
+    <p:sldId id="275" r:id="rId26"/>
+    <p:sldId id="276" r:id="rId27"/>
   </p:sldIdLst>
   <p:sldSz cx="12191695" cy="6858000" type="screen4x3"/>
   <p:notesSz cx="6858000" cy="9144000"/>
@@ -3167,7 +3173,7 @@
               </a:defRPr>
             </a:pPr>
             <a:r>
-              <a:t>基于NVIDIA Jetson Nano的实时人脸识别系统</a:t>
+              <a:t>Real-time Face Recognition System on NVIDIA Jetson Nano</a:t>
             </a:r>
           </a:p>
           <a:p>
@@ -3296,7 +3302,7 @@
               </a:defRPr>
             </a:pPr>
             <a:r>
-              <a:t>Face Alignment</a:t>
+              <a:t>Detection Loss Functions</a:t>
             </a:r>
           </a:p>
         </p:txBody>
@@ -3325,61 +3331,106 @@
           <a:p>
             <a:pPr>
               <a:spcBef>
-                <a:spcPts val="1200"/>
-              </a:spcBef>
-              <a:defRPr sz="2400">
-                <a:solidFill>
-                  <a:srgbClr val="202020"/>
-                </a:solidFill>
-              </a:defRPr>
-            </a:pPr>
-            <a:r>
-              <a:t>• 目标：标准化face姿态、尺寸、旋转</a:t>
-            </a:r>
-          </a:p>
-          <a:p>
-            <a:pPr>
-              <a:spcBef>
-                <a:spcPts val="1200"/>
-              </a:spcBef>
-              <a:defRPr sz="2400">
-                <a:solidFill>
-                  <a:srgbClr val="202020"/>
-                </a:solidFill>
-              </a:defRPr>
-            </a:pPr>
-            <a:r>
-              <a:t>• 基于关键点的相似性变换（SVD唯一解）</a:t>
-            </a:r>
-          </a:p>
-          <a:p>
-            <a:pPr>
-              <a:spcBef>
-                <a:spcPts val="1200"/>
-              </a:spcBef>
-              <a:defRPr sz="2400">
-                <a:solidFill>
-                  <a:srgbClr val="202020"/>
-                </a:solidFill>
-              </a:defRPr>
-            </a:pPr>
-            <a:r>
-              <a:t>• 优化目标：min_{s,R,t} Σ|y_i - (sRx_i + t)|²</a:t>
-            </a:r>
-          </a:p>
-          <a:p>
-            <a:pPr>
-              <a:spcBef>
-                <a:spcPts val="1200"/>
-              </a:spcBef>
-              <a:defRPr sz="2400">
-                <a:solidFill>
-                  <a:srgbClr val="202020"/>
-                </a:solidFill>
-              </a:defRPr>
-            </a:pPr>
-            <a:r>
-              <a:t>• 对齐提升后续特征提取准确性</a:t>
+                <a:spcPts val="800"/>
+              </a:spcBef>
+              <a:defRPr sz="2400">
+                <a:solidFill>
+                  <a:srgbClr val="202020"/>
+                </a:solidFill>
+              </a:defRPr>
+            </a:pPr>
+            <a:r>
+              <a:t>Classification (Focal Loss):</a:t>
+            </a:r>
+          </a:p>
+          <a:p>
+            <a:pPr>
+              <a:spcBef>
+                <a:spcPts val="800"/>
+              </a:spcBef>
+              <a:defRPr sz="2000">
+                <a:solidFill>
+                  <a:srgbClr val="202020"/>
+                </a:solidFill>
+              </a:defRPr>
+            </a:pPr>
+            <a:r>
+              <a:t>  - Handles hard examples, balances positives/negatives</a:t>
+            </a:r>
+          </a:p>
+          <a:p>
+            <a:pPr>
+              <a:spcBef>
+                <a:spcPts val="800"/>
+              </a:spcBef>
+              <a:defRPr sz="2400">
+                <a:solidFill>
+                  <a:srgbClr val="202020"/>
+                </a:solidFill>
+              </a:defRPr>
+            </a:pPr>
+            <a:r>
+              <a:t>Box Regression (Smooth L1 or IoU):</a:t>
+            </a:r>
+          </a:p>
+          <a:p>
+            <a:pPr>
+              <a:spcBef>
+                <a:spcPts val="800"/>
+              </a:spcBef>
+              <a:defRPr sz="2000">
+                <a:solidFill>
+                  <a:srgbClr val="202020"/>
+                </a:solidFill>
+              </a:defRPr>
+            </a:pPr>
+            <a:r>
+              <a:t>  - L_box = sum SmoothL1(t - t*) or 1 - IoU(B, B*)</a:t>
+            </a:r>
+          </a:p>
+          <a:p>
+            <a:pPr>
+              <a:spcBef>
+                <a:spcPts val="800"/>
+              </a:spcBef>
+              <a:defRPr sz="2400">
+                <a:solidFill>
+                  <a:srgbClr val="202020"/>
+                </a:solidFill>
+              </a:defRPr>
+            </a:pPr>
+            <a:r>
+              <a:t>Landmark Regression:</a:t>
+            </a:r>
+          </a:p>
+          <a:p>
+            <a:pPr>
+              <a:spcBef>
+                <a:spcPts val="800"/>
+              </a:spcBef>
+              <a:defRPr sz="2000">
+                <a:solidFill>
+                  <a:srgbClr val="202020"/>
+                </a:solidFill>
+              </a:defRPr>
+            </a:pPr>
+            <a:r>
+              <a:t>  - L_kps = sum ||l^(k) - l^(k)*||_1</a:t>
+            </a:r>
+          </a:p>
+          <a:p>
+            <a:pPr>
+              <a:spcBef>
+                <a:spcPts val="800"/>
+              </a:spcBef>
+              <a:defRPr sz="2400">
+                <a:solidFill>
+                  <a:srgbClr val="202020"/>
+                </a:solidFill>
+              </a:defRPr>
+            </a:pPr>
+            <a:r>
+              <a:t>Post-processing: NMS (IoU threshold filters overlaps)</a:t>
             </a:r>
           </a:p>
         </p:txBody>
@@ -3510,7 +3561,7 @@
               </a:defRPr>
             </a:pPr>
             <a:r>
-              <a:t>Face Recognition: ArcFace</a:t>
+              <a:t>RetinaFace vs SCRFD</a:t>
             </a:r>
           </a:p>
         </p:txBody>
@@ -3539,76 +3590,121 @@
           <a:p>
             <a:pPr>
               <a:spcBef>
-                <a:spcPts val="1200"/>
-              </a:spcBef>
-              <a:defRPr sz="2400">
-                <a:solidFill>
-                  <a:srgbClr val="202020"/>
-                </a:solidFill>
-              </a:defRPr>
-            </a:pPr>
-            <a:r>
-              <a:t>• 特征空间 f ∈ ℝ^d，同人接近、异人远离</a:t>
-            </a:r>
-          </a:p>
-          <a:p>
-            <a:pPr>
-              <a:spcBef>
-                <a:spcPts val="1200"/>
-              </a:spcBef>
-              <a:defRPr sz="2400">
-                <a:solidFill>
-                  <a:srgbClr val="202020"/>
-                </a:solidFill>
-              </a:defRPr>
-            </a:pPr>
-            <a:r>
-              <a:t>• Margin-based softmax损失函数</a:t>
-            </a:r>
-          </a:p>
-          <a:p>
-            <a:pPr>
-              <a:spcBef>
-                <a:spcPts val="1200"/>
-              </a:spcBef>
-              <a:defRPr sz="2400">
-                <a:solidFill>
-                  <a:srgbClr val="202020"/>
-                </a:solidFill>
-              </a:defRPr>
-            </a:pPr>
-            <a:r>
-              <a:t>• L_arc = -log(e^{s·cos(θ_y+m)} / (e^{s·cos(θ_y+m)} + Σ_{j≠y}e^{s·cos θ_j}))</a:t>
-            </a:r>
-          </a:p>
-          <a:p>
-            <a:pPr>
-              <a:spcBef>
-                <a:spcPts val="1200"/>
-              </a:spcBef>
-              <a:defRPr sz="2400">
-                <a:solidFill>
-                  <a:srgbClr val="202020"/>
-                </a:solidFill>
-              </a:defRPr>
-            </a:pPr>
-            <a:r>
-              <a:t>• ArcFace将特征约束在超球面上，显式扩大判别角度间隔</a:t>
-            </a:r>
-          </a:p>
-          <a:p>
-            <a:pPr>
-              <a:spcBef>
-                <a:spcPts val="1200"/>
-              </a:spcBef>
-              <a:defRPr sz="2400">
-                <a:solidFill>
-                  <a:srgbClr val="202020"/>
-                </a:solidFill>
-              </a:defRPr>
-            </a:pPr>
-            <a:r>
-              <a:t>• 推理阶段余弦相似度检索</a:t>
+                <a:spcPts val="800"/>
+              </a:spcBef>
+              <a:defRPr sz="2400">
+                <a:solidFill>
+                  <a:srgbClr val="202020"/>
+                </a:solidFill>
+              </a:defRPr>
+            </a:pPr>
+            <a:r>
+              <a:t>Common: Dense multi-scale prediction + multi-task loss</a:t>
+            </a:r>
+          </a:p>
+          <a:p>
+            <a:pPr>
+              <a:spcBef>
+                <a:spcPts val="800"/>
+              </a:spcBef>
+              <a:defRPr sz="2400">
+                <a:solidFill>
+                  <a:srgbClr val="202020"/>
+                </a:solidFill>
+              </a:defRPr>
+            </a:pPr>
+            <a:r>
+              <a:t>RetinaFace:</a:t>
+            </a:r>
+          </a:p>
+          <a:p>
+            <a:pPr>
+              <a:spcBef>
+                <a:spcPts val="800"/>
+              </a:spcBef>
+              <a:defRPr sz="2000">
+                <a:solidFill>
+                  <a:srgbClr val="202020"/>
+                </a:solidFill>
+              </a:defRPr>
+            </a:pPr>
+            <a:r>
+              <a:t>  - Accurate localization and landmark prediction</a:t>
+            </a:r>
+          </a:p>
+          <a:p>
+            <a:pPr>
+              <a:spcBef>
+                <a:spcPts val="800"/>
+              </a:spcBef>
+              <a:defRPr sz="2000">
+                <a:solidFill>
+                  <a:srgbClr val="202020"/>
+                </a:solidFill>
+              </a:defRPr>
+            </a:pPr>
+            <a:r>
+              <a:t>  - Multi-level features + multi-task supervision</a:t>
+            </a:r>
+          </a:p>
+          <a:p>
+            <a:pPr>
+              <a:spcBef>
+                <a:spcPts val="800"/>
+              </a:spcBef>
+              <a:defRPr sz="2400">
+                <a:solidFill>
+                  <a:srgbClr val="202020"/>
+                </a:solidFill>
+              </a:defRPr>
+            </a:pPr>
+            <a:r>
+              <a:t>SCRFD:</a:t>
+            </a:r>
+          </a:p>
+          <a:p>
+            <a:pPr>
+              <a:spcBef>
+                <a:spcPts val="800"/>
+              </a:spcBef>
+              <a:defRPr sz="2000">
+                <a:solidFill>
+                  <a:srgbClr val="202020"/>
+                </a:solidFill>
+              </a:defRPr>
+            </a:pPr>
+            <a:r>
+              <a:t>  - Efficiency under constrained compute budgets</a:t>
+            </a:r>
+          </a:p>
+          <a:p>
+            <a:pPr>
+              <a:spcBef>
+                <a:spcPts val="800"/>
+              </a:spcBef>
+              <a:defRPr sz="2000">
+                <a:solidFill>
+                  <a:srgbClr val="202020"/>
+                </a:solidFill>
+              </a:defRPr>
+            </a:pPr>
+            <a:r>
+              <a:t>  - Redistributes samples and computation</a:t>
+            </a:r>
+          </a:p>
+          <a:p>
+            <a:pPr>
+              <a:spcBef>
+                <a:spcPts val="800"/>
+              </a:spcBef>
+              <a:defRPr sz="2000">
+                <a:solidFill>
+                  <a:srgbClr val="202020"/>
+                </a:solidFill>
+              </a:defRPr>
+            </a:pPr>
+            <a:r>
+              <a:t>  - Better for real-time deployment</a:t>
             </a:r>
           </a:p>
         </p:txBody>
@@ -3739,7 +3835,7 @@
               </a:defRPr>
             </a:pPr>
             <a:r>
-              <a:t>系统实现与优化</a:t>
+              <a:t>5. Face Alignment: Similarity Transform</a:t>
             </a:r>
           </a:p>
         </p:txBody>
@@ -3768,61 +3864,121 @@
           <a:p>
             <a:pPr>
               <a:spcBef>
-                <a:spcPts val="1200"/>
-              </a:spcBef>
-              <a:defRPr sz="2400">
-                <a:solidFill>
-                  <a:srgbClr val="202020"/>
-                </a:solidFill>
-              </a:defRPr>
-            </a:pPr>
-            <a:r>
-              <a:t>• ONNX转换：PyTorch → ONNX</a:t>
-            </a:r>
-          </a:p>
-          <a:p>
-            <a:pPr>
-              <a:spcBef>
-                <a:spcPts val="1200"/>
-              </a:spcBef>
-              <a:defRPr sz="2400">
-                <a:solidFill>
-                  <a:srgbClr val="202020"/>
-                </a:solidFill>
-              </a:defRPr>
-            </a:pPr>
-            <a:r>
-              <a:t>• TensorRT引擎生成与FP16精度部署</a:t>
-            </a:r>
-          </a:p>
-          <a:p>
-            <a:pPr>
-              <a:spcBef>
-                <a:spcPts val="1200"/>
-              </a:spcBef>
-              <a:defRPr sz="2400">
-                <a:solidFill>
-                  <a:srgbClr val="202020"/>
-                </a:solidFill>
-              </a:defRPr>
-            </a:pPr>
-            <a:r>
-              <a:t>• 优化推理流水线，缩短响应延迟</a:t>
-            </a:r>
-          </a:p>
-          <a:p>
-            <a:pPr>
-              <a:spcBef>
-                <a:spcPts val="1200"/>
-              </a:spcBef>
-              <a:defRPr sz="2400">
-                <a:solidFill>
-                  <a:srgbClr val="202020"/>
-                </a:solidFill>
-              </a:defRPr>
-            </a:pPr>
-            <a:r>
-              <a:t>• 典型人脸识别端到端延迟展示</a:t>
+                <a:spcPts val="800"/>
+              </a:spcBef>
+              <a:defRPr sz="2400">
+                <a:solidFill>
+                  <a:srgbClr val="202020"/>
+                </a:solidFill>
+              </a:defRPr>
+            </a:pPr>
+            <a:r>
+              <a:t>Goal: Normalize pose/scale/rotation</a:t>
+            </a:r>
+          </a:p>
+          <a:p>
+            <a:pPr>
+              <a:spcBef>
+                <a:spcPts val="800"/>
+              </a:spcBef>
+              <a:defRPr sz="2400">
+                <a:solidFill>
+                  <a:srgbClr val="202020"/>
+                </a:solidFill>
+              </a:defRPr>
+            </a:pPr>
+            <a:r>
+              <a:t>Given detected landmarks {x_i} and template {y_i}:</a:t>
+            </a:r>
+          </a:p>
+          <a:p>
+            <a:pPr>
+              <a:spcBef>
+                <a:spcPts val="800"/>
+              </a:spcBef>
+              <a:defRPr sz="2000">
+                <a:solidFill>
+                  <a:srgbClr val="202020"/>
+                </a:solidFill>
+              </a:defRPr>
+            </a:pPr>
+            <a:r>
+              <a:t>  - min_{s,R,t} sum ||y_i - (s*R*x_i + t)||^2</a:t>
+            </a:r>
+          </a:p>
+          <a:p>
+            <a:pPr>
+              <a:spcBef>
+                <a:spcPts val="800"/>
+              </a:spcBef>
+              <a:defRPr sz="2400">
+                <a:solidFill>
+                  <a:srgbClr val="202020"/>
+                </a:solidFill>
+              </a:defRPr>
+            </a:pPr>
+            <a:r>
+              <a:t>SVD solution: H = X_c * Y_c^T = U*Sigma*V^T</a:t>
+            </a:r>
+          </a:p>
+          <a:p>
+            <a:pPr>
+              <a:spcBef>
+                <a:spcPts val="800"/>
+              </a:spcBef>
+              <a:defRPr sz="2000">
+                <a:solidFill>
+                  <a:srgbClr val="202020"/>
+                </a:solidFill>
+              </a:defRPr>
+            </a:pPr>
+            <a:r>
+              <a:t>  - R = V*U^T (rotation)</a:t>
+            </a:r>
+          </a:p>
+          <a:p>
+            <a:pPr>
+              <a:spcBef>
+                <a:spcPts val="800"/>
+              </a:spcBef>
+              <a:defRPr sz="2000">
+                <a:solidFill>
+                  <a:srgbClr val="202020"/>
+                </a:solidFill>
+              </a:defRPr>
+            </a:pPr>
+            <a:r>
+              <a:t>  - s = tr(Sigma)/||X_c||_F^2 (scale)</a:t>
+            </a:r>
+          </a:p>
+          <a:p>
+            <a:pPr>
+              <a:spcBef>
+                <a:spcPts val="800"/>
+              </a:spcBef>
+              <a:defRPr sz="2000">
+                <a:solidFill>
+                  <a:srgbClr val="202020"/>
+                </a:solidFill>
+              </a:defRPr>
+            </a:pPr>
+            <a:r>
+              <a:t>  - t = y_bar - s*R*x_bar (translation)</a:t>
+            </a:r>
+          </a:p>
+          <a:p>
+            <a:pPr>
+              <a:spcBef>
+                <a:spcPts val="800"/>
+              </a:spcBef>
+              <a:defRPr sz="2400">
+                <a:solidFill>
+                  <a:srgbClr val="202020"/>
+                </a:solidFill>
+              </a:defRPr>
+            </a:pPr>
+            <a:r>
+              <a:t>Output: 112x112 aligned face image</a:t>
             </a:r>
           </a:p>
         </p:txBody>
@@ -3953,7 +4109,7 @@
               </a:defRPr>
             </a:pPr>
             <a:r>
-              <a:t>实验与评估</a:t>
+              <a:t>6. ArcFace: Normalized Softmax</a:t>
             </a:r>
           </a:p>
         </p:txBody>
@@ -3982,61 +4138,91 @@
           <a:p>
             <a:pPr>
               <a:spcBef>
-                <a:spcPts val="1200"/>
-              </a:spcBef>
-              <a:defRPr sz="2400">
-                <a:solidFill>
-                  <a:srgbClr val="202020"/>
-                </a:solidFill>
-              </a:defRPr>
-            </a:pPr>
-            <a:r>
-              <a:t>• Jetson Nano端测试</a:t>
-            </a:r>
-          </a:p>
-          <a:p>
-            <a:pPr>
-              <a:spcBef>
-                <a:spcPts val="1200"/>
-              </a:spcBef>
-              <a:defRPr sz="2400">
-                <a:solidFill>
-                  <a:srgbClr val="202020"/>
-                </a:solidFill>
-              </a:defRPr>
-            </a:pPr>
-            <a:r>
-              <a:t>• 指标：人脸检测与识别的准确率、延迟、吞吐量</a:t>
-            </a:r>
-          </a:p>
-          <a:p>
-            <a:pPr>
-              <a:spcBef>
-                <a:spcPts val="1200"/>
-              </a:spcBef>
-              <a:defRPr sz="2400">
-                <a:solidFill>
-                  <a:srgbClr val="202020"/>
-                </a:solidFill>
-              </a:defRPr>
-            </a:pPr>
-            <a:r>
-              <a:t>• 复杂环境下鲁棒性高（遮挡、光照变化等）</a:t>
-            </a:r>
-          </a:p>
-          <a:p>
-            <a:pPr>
-              <a:spcBef>
-                <a:spcPts val="1200"/>
-              </a:spcBef>
-              <a:defRPr sz="2400">
-                <a:solidFill>
-                  <a:srgbClr val="202020"/>
-                </a:solidFill>
-              </a:defRPr>
-            </a:pPr>
-            <a:r>
-              <a:t>• FP16量化后加速2-3倍，维持高准确率</a:t>
+                <a:spcPts val="800"/>
+              </a:spcBef>
+              <a:defRPr sz="2400">
+                <a:solidFill>
+                  <a:srgbClr val="202020"/>
+                </a:solidFill>
+              </a:defRPr>
+            </a:pPr>
+            <a:r>
+              <a:t>Goal: Same-identity close, different far apart</a:t>
+            </a:r>
+          </a:p>
+          <a:p>
+            <a:pPr>
+              <a:spcBef>
+                <a:spcPts val="800"/>
+              </a:spcBef>
+              <a:defRPr sz="2400">
+                <a:solidFill>
+                  <a:srgbClr val="202020"/>
+                </a:solidFill>
+              </a:defRPr>
+            </a:pPr>
+            <a:r>
+              <a:t>Normalized Softmax: features and weights normalized</a:t>
+            </a:r>
+          </a:p>
+          <a:p>
+            <a:pPr>
+              <a:spcBef>
+                <a:spcPts val="800"/>
+              </a:spcBef>
+              <a:defRPr sz="2000">
+                <a:solidFill>
+                  <a:srgbClr val="202020"/>
+                </a:solidFill>
+              </a:defRPr>
+            </a:pPr>
+            <a:r>
+              <a:t>  - f_tilde = f/||f||, w_tilde_j = w_j/||w_j||</a:t>
+            </a:r>
+          </a:p>
+          <a:p>
+            <a:pPr>
+              <a:spcBef>
+                <a:spcPts val="800"/>
+              </a:spcBef>
+              <a:defRPr sz="2000">
+                <a:solidFill>
+                  <a:srgbClr val="202020"/>
+                </a:solidFill>
+              </a:defRPr>
+            </a:pPr>
+            <a:r>
+              <a:t>  - w_tilde_j^T * f_tilde = cos(theta_j)</a:t>
+            </a:r>
+          </a:p>
+          <a:p>
+            <a:pPr>
+              <a:spcBef>
+                <a:spcPts val="800"/>
+              </a:spcBef>
+              <a:defRPr sz="2400">
+                <a:solidFill>
+                  <a:srgbClr val="202020"/>
+                </a:solidFill>
+              </a:defRPr>
+            </a:pPr>
+            <a:r>
+              <a:t>Scale factor s sharpens softmax:</a:t>
+            </a:r>
+          </a:p>
+          <a:p>
+            <a:pPr>
+              <a:spcBef>
+                <a:spcPts val="800"/>
+              </a:spcBef>
+              <a:defRPr sz="2000">
+                <a:solidFill>
+                  <a:srgbClr val="202020"/>
+                </a:solidFill>
+              </a:defRPr>
+            </a:pPr>
+            <a:r>
+              <a:t>  - L_soft = -log(e^{s*cos(theta_y)} / sum e^{s*cos(theta_j)})</a:t>
             </a:r>
           </a:p>
         </p:txBody>
@@ -4167,7 +4353,7 @@
               </a:defRPr>
             </a:pPr>
             <a:r>
-              <a:t>总结与展望</a:t>
+              <a:t>ArcFace: Additive Angular Margin</a:t>
             </a:r>
           </a:p>
         </p:txBody>
@@ -4196,52 +4382,22 @@
           <a:p>
             <a:pPr>
               <a:spcBef>
-                <a:spcPts val="1200"/>
-              </a:spcBef>
-              <a:defRPr sz="2400">
-                <a:solidFill>
-                  <a:srgbClr val="202020"/>
-                </a:solidFill>
-              </a:defRPr>
-            </a:pPr>
-            <a:r>
-              <a:t>• 实现了高效、高精度嵌入式人脸识别系统</a:t>
-            </a:r>
-          </a:p>
-          <a:p>
-            <a:pPr>
-              <a:spcBef>
-                <a:spcPts val="1200"/>
-              </a:spcBef>
-              <a:defRPr sz="2400">
-                <a:solidFill>
-                  <a:srgbClr val="202020"/>
-                </a:solidFill>
-              </a:defRPr>
-            </a:pPr>
-            <a:r>
-              <a:t>• ArcFace + RetinaFace + TensorRT 最佳实践</a:t>
-            </a:r>
-          </a:p>
-          <a:p>
-            <a:pPr>
-              <a:spcBef>
-                <a:spcPts val="1200"/>
-              </a:spcBef>
-              <a:defRPr sz="2400">
-                <a:solidFill>
-                  <a:srgbClr val="202020"/>
-                </a:solidFill>
-              </a:defRPr>
-            </a:pPr>
-            <a:r>
-              <a:t>• 后续方向：</a:t>
-            </a:r>
-          </a:p>
-          <a:p>
-            <a:pPr lvl="1">
-              <a:spcBef>
-                <a:spcPts val="600"/>
+                <a:spcPts val="800"/>
+              </a:spcBef>
+              <a:defRPr sz="2400">
+                <a:solidFill>
+                  <a:srgbClr val="202020"/>
+                </a:solidFill>
+              </a:defRPr>
+            </a:pPr>
+            <a:r>
+              <a:t>Add angular margin m&gt;0 to target class:</a:t>
+            </a:r>
+          </a:p>
+          <a:p>
+            <a:pPr>
+              <a:spcBef>
+                <a:spcPts val="800"/>
               </a:spcBef>
               <a:defRPr sz="2000">
                 <a:solidFill>
@@ -4250,13 +4406,28 @@
               </a:defRPr>
             </a:pPr>
             <a:r>
-              <a:t>• 轻量化骨干</a:t>
-            </a:r>
-          </a:p>
-          <a:p>
-            <a:pPr lvl="1">
-              <a:spcBef>
-                <a:spcPts val="600"/>
+              <a:t>  - l_j = s*cos(theta_y+m) if j=y, else s*cos(theta_j)</a:t>
+            </a:r>
+          </a:p>
+          <a:p>
+            <a:pPr>
+              <a:spcBef>
+                <a:spcPts val="800"/>
+              </a:spcBef>
+              <a:defRPr sz="2400">
+                <a:solidFill>
+                  <a:srgbClr val="202020"/>
+                </a:solidFill>
+              </a:defRPr>
+            </a:pPr>
+            <a:r>
+              <a:t>ArcFace Loss:</a:t>
+            </a:r>
+          </a:p>
+          <a:p>
+            <a:pPr>
+              <a:spcBef>
+                <a:spcPts val="800"/>
               </a:spcBef>
               <a:defRPr sz="2000">
                 <a:solidFill>
@@ -4265,13 +4436,28 @@
               </a:defRPr>
             </a:pPr>
             <a:r>
-              <a:t>• 边缘协同推理</a:t>
-            </a:r>
-          </a:p>
-          <a:p>
-            <a:pPr lvl="1">
-              <a:spcBef>
-                <a:spcPts val="600"/>
+              <a:t>  - L_arc = -log(e^{s*cos(theta_y+m)} / (...))</a:t>
+            </a:r>
+          </a:p>
+          <a:p>
+            <a:pPr>
+              <a:spcBef>
+                <a:spcPts val="800"/>
+              </a:spcBef>
+              <a:defRPr sz="2400">
+                <a:solidFill>
+                  <a:srgbClr val="202020"/>
+                </a:solidFill>
+              </a:defRPr>
+            </a:pPr>
+            <a:r>
+              <a:t>Geometry: cos(theta_y+m) &lt; cos(theta_y)</a:t>
+            </a:r>
+          </a:p>
+          <a:p>
+            <a:pPr>
+              <a:spcBef>
+                <a:spcPts val="800"/>
               </a:spcBef>
               <a:defRPr sz="2000">
                 <a:solidFill>
@@ -4280,13 +4466,13 @@
               </a:defRPr>
             </a:pPr>
             <a:r>
-              <a:t>• 多模态融合</a:t>
-            </a:r>
-          </a:p>
-          <a:p>
-            <a:pPr lvl="1">
-              <a:spcBef>
-                <a:spcPts val="600"/>
+              <a:t>  - Must reduce theta_y to compensate</a:t>
+            </a:r>
+          </a:p>
+          <a:p>
+            <a:pPr>
+              <a:spcBef>
+                <a:spcPts val="800"/>
               </a:spcBef>
               <a:defRPr sz="2000">
                 <a:solidFill>
@@ -4295,7 +4481,22 @@
               </a:defRPr>
             </a:pPr>
             <a:r>
-              <a:t>• 隐私保护</a:t>
+              <a:t>  - Promotes intra-class compactness, inter-class gap</a:t>
+            </a:r>
+          </a:p>
+          <a:p>
+            <a:pPr>
+              <a:spcBef>
+                <a:spcPts val="800"/>
+              </a:spcBef>
+              <a:defRPr sz="2400">
+                <a:solidFill>
+                  <a:srgbClr val="202020"/>
+                </a:solidFill>
+              </a:defRPr>
+            </a:pPr>
+            <a:r>
+              <a:t>Typical: s~64, m~0.5</a:t>
             </a:r>
           </a:p>
         </p:txBody>
@@ -4426,7 +4627,7 @@
               </a:defRPr>
             </a:pPr>
             <a:r>
-              <a:t>致谢与参考文献</a:t>
+              <a:t>ArcFace Implementation</a:t>
             </a:r>
           </a:p>
         </p:txBody>
@@ -4455,37 +4656,22 @@
           <a:p>
             <a:pPr>
               <a:spcBef>
-                <a:spcPts val="1200"/>
-              </a:spcBef>
-              <a:defRPr sz="2400">
-                <a:solidFill>
-                  <a:srgbClr val="202020"/>
-                </a:solidFill>
-              </a:defRPr>
-            </a:pPr>
-            <a:r>
-              <a:t>• ACM参考文献样式 BibTeX</a:t>
-            </a:r>
-          </a:p>
-          <a:p>
-            <a:pPr>
-              <a:spcBef>
-                <a:spcPts val="1200"/>
-              </a:spcBef>
-              <a:defRPr sz="2400">
-                <a:solidFill>
-                  <a:srgbClr val="202020"/>
-                </a:solidFill>
-              </a:defRPr>
-            </a:pPr>
-            <a:r>
-              <a:t>• 主要参考项目和论文：</a:t>
-            </a:r>
-          </a:p>
-          <a:p>
-            <a:pPr lvl="1">
-              <a:spcBef>
-                <a:spcPts val="600"/>
+                <a:spcPts val="800"/>
+              </a:spcBef>
+              <a:defRPr sz="2400">
+                <a:solidFill>
+                  <a:srgbClr val="202020"/>
+                </a:solidFill>
+              </a:defRPr>
+            </a:pPr>
+            <a:r>
+              <a:t>Avoid explicit arccos:</a:t>
+            </a:r>
+          </a:p>
+          <a:p>
+            <a:pPr>
+              <a:spcBef>
+                <a:spcPts val="800"/>
               </a:spcBef>
               <a:defRPr sz="2000">
                 <a:solidFill>
@@ -4494,13 +4680,13 @@
               </a:defRPr>
             </a:pPr>
             <a:r>
-              <a:t>• InsightFace: https://github.com/deepinsight/insightface</a:t>
-            </a:r>
-          </a:p>
-          <a:p>
-            <a:pPr lvl="1">
-              <a:spcBef>
-                <a:spcPts val="600"/>
+              <a:t>  - cos(theta_y+m) = cos(theta_y)*cos(m) - sin(theta_y)*sin(m)</a:t>
+            </a:r>
+          </a:p>
+          <a:p>
+            <a:pPr>
+              <a:spcBef>
+                <a:spcPts val="800"/>
               </a:spcBef>
               <a:defRPr sz="2000">
                 <a:solidFill>
@@ -4509,13 +4695,43 @@
               </a:defRPr>
             </a:pPr>
             <a:r>
-              <a:t>• RetinaFace: Deng et al., 2020</a:t>
-            </a:r>
-          </a:p>
-          <a:p>
-            <a:pPr lvl="1">
-              <a:spcBef>
-                <a:spcPts val="600"/>
+              <a:t>  - sin(theta_y) = sqrt(1 - cos^2(theta_y))</a:t>
+            </a:r>
+          </a:p>
+          <a:p>
+            <a:pPr>
+              <a:spcBef>
+                <a:spcPts val="800"/>
+              </a:spcBef>
+              <a:defRPr sz="2400">
+                <a:solidFill>
+                  <a:srgbClr val="202020"/>
+                </a:solidFill>
+              </a:defRPr>
+            </a:pPr>
+            <a:r>
+              <a:t>Clamping for numerical stability</a:t>
+            </a:r>
+          </a:p>
+          <a:p>
+            <a:pPr>
+              <a:spcBef>
+                <a:spcPts val="800"/>
+              </a:spcBef>
+              <a:defRPr sz="2400">
+                <a:solidFill>
+                  <a:srgbClr val="202020"/>
+                </a:solidFill>
+              </a:defRPr>
+            </a:pPr>
+            <a:r>
+              <a:t>Inference:</a:t>
+            </a:r>
+          </a:p>
+          <a:p>
+            <a:pPr>
+              <a:spcBef>
+                <a:spcPts val="800"/>
               </a:spcBef>
               <a:defRPr sz="2000">
                 <a:solidFill>
@@ -4524,13 +4740,13 @@
               </a:defRPr>
             </a:pPr>
             <a:r>
-              <a:t>• ArcFace: Deng et al., CVPR 2019</a:t>
-            </a:r>
-          </a:p>
-          <a:p>
-            <a:pPr lvl="1">
-              <a:spcBef>
-                <a:spcPts val="600"/>
+              <a:t>  - Discard classification head, use embeddings only</a:t>
+            </a:r>
+          </a:p>
+          <a:p>
+            <a:pPr>
+              <a:spcBef>
+                <a:spcPts val="800"/>
               </a:spcBef>
               <a:defRPr sz="2000">
                 <a:solidFill>
@@ -4539,37 +4755,1043 @@
               </a:defRPr>
             </a:pPr>
             <a:r>
-              <a:t>• TensorRT: NVIDIA Developer</a:t>
-            </a:r>
-          </a:p>
-          <a:p>
-            <a:pPr>
-              <a:spcBef>
-                <a:spcPts val="1200"/>
-              </a:spcBef>
-              <a:defRPr sz="2400">
-                <a:solidFill>
-                  <a:srgbClr val="202020"/>
-                </a:solidFill>
-              </a:defRPr>
-            </a:pPr>
-            <a:r>
-              <a:t>• </a:t>
-            </a:r>
-          </a:p>
-          <a:p>
-            <a:pPr>
-              <a:spcBef>
-                <a:spcPts val="1200"/>
-              </a:spcBef>
-              <a:defRPr sz="2400">
-                <a:solidFill>
-                  <a:srgbClr val="202020"/>
-                </a:solidFill>
-              </a:defRPr>
-            </a:pPr>
-            <a:r>
-              <a:t>• 感谢SUSTech提供的硬件资源和指导</a:t>
+              <a:t>  - L2-normalize, cosine similarity comparison</a:t>
+            </a:r>
+          </a:p>
+          <a:p>
+            <a:pPr>
+              <a:spcBef>
+                <a:spcPts val="800"/>
+              </a:spcBef>
+              <a:defRPr sz="2000">
+                <a:solidFill>
+                  <a:srgbClr val="202020"/>
+                </a:solidFill>
+              </a:defRPr>
+            </a:pPr>
+            <a:r>
+              <a:t>  - sim(f_a, f_b) = f_a^T*f_b / (||f_a||*||f_b||)</a:t>
+            </a:r>
+          </a:p>
+        </p:txBody>
+      </p:sp>
+      <p:sp>
+        <p:nvSpPr>
+          <p:cNvPr id="5" name="TextBox 4"/>
+          <p:cNvSpPr txBox="1"/>
+          <p:nvPr/>
+        </p:nvSpPr>
+        <p:spPr>
+          <a:xfrm>
+            <a:off x="457200" y="6400800"/>
+            <a:ext cx="11277295" cy="365760"/>
+          </a:xfrm>
+          <a:prstGeom prst="rect">
+            <a:avLst/>
+          </a:prstGeom>
+          <a:noFill/>
+        </p:spPr>
+        <p:txBody>
+          <a:bodyPr wrap="none">
+            <a:spAutoFit/>
+          </a:bodyPr>
+          <a:lstStyle/>
+          <a:p>
+            <a:pPr>
+              <a:defRPr sz="1000">
+                <a:solidFill>
+                  <a:srgbClr val="808080"/>
+                </a:solidFill>
+              </a:defRPr>
+            </a:pPr>
+            <a:r>
+              <a:t>Face Recognition | SUSTech | Tang, Li, Yang, Zhu, Wei</a:t>
+            </a:r>
+          </a:p>
+        </p:txBody>
+      </p:sp>
+    </p:spTree>
+  </p:cSld>
+  <p:clrMapOvr>
+    <a:masterClrMapping/>
+  </p:clrMapOvr>
+</p:sld>
+</file>
+
+<file path=ppt/slides/slide16.xml><?xml version="1.0" encoding="utf-8"?>
+<p:sld xmlns:a="http://schemas.openxmlformats.org/drawingml/2006/main" xmlns:p="http://schemas.openxmlformats.org/presentationml/2006/main" xmlns:r="http://schemas.openxmlformats.org/officeDocument/2006/relationships">
+  <p:cSld>
+    <p:spTree>
+      <p:nvGrpSpPr>
+        <p:cNvPr id="1" name=""/>
+        <p:cNvGrpSpPr/>
+        <p:nvPr/>
+      </p:nvGrpSpPr>
+      <p:grpSpPr/>
+      <p:sp>
+        <p:nvSpPr>
+          <p:cNvPr id="2" name="Rectangle 1"/>
+          <p:cNvSpPr/>
+          <p:nvPr/>
+        </p:nvSpPr>
+        <p:spPr>
+          <a:xfrm>
+            <a:off x="0" y="0"/>
+            <a:ext cx="12191695" cy="1097280"/>
+          </a:xfrm>
+          <a:prstGeom prst="rect">
+            <a:avLst/>
+          </a:prstGeom>
+          <a:solidFill>
+            <a:srgbClr val="003366"/>
+          </a:solidFill>
+          <a:ln>
+            <a:noFill/>
+          </a:ln>
+        </p:spPr>
+        <p:style>
+          <a:lnRef idx="1">
+            <a:schemeClr val="accent1"/>
+          </a:lnRef>
+          <a:fillRef idx="3">
+            <a:schemeClr val="accent1"/>
+          </a:fillRef>
+          <a:effectRef idx="2">
+            <a:schemeClr val="accent1"/>
+          </a:effectRef>
+          <a:fontRef idx="minor">
+            <a:schemeClr val="lt1"/>
+          </a:fontRef>
+        </p:style>
+        <p:txBody>
+          <a:bodyPr rtlCol="0" anchor="ctr"/>
+          <a:lstStyle/>
+          <a:p>
+            <a:pPr algn="ctr"/>
+          </a:p>
+        </p:txBody>
+      </p:sp>
+      <p:sp>
+        <p:nvSpPr>
+          <p:cNvPr id="3" name="TextBox 2"/>
+          <p:cNvSpPr txBox="1"/>
+          <p:nvPr/>
+        </p:nvSpPr>
+        <p:spPr>
+          <a:xfrm>
+            <a:off x="457200" y="274320"/>
+            <a:ext cx="11277295" cy="731520"/>
+          </a:xfrm>
+          <a:prstGeom prst="rect">
+            <a:avLst/>
+          </a:prstGeom>
+          <a:noFill/>
+        </p:spPr>
+        <p:txBody>
+          <a:bodyPr wrap="none">
+            <a:spAutoFit/>
+          </a:bodyPr>
+          <a:lstStyle/>
+          <a:p>
+            <a:pPr>
+              <a:defRPr sz="3200" b="1">
+                <a:solidFill>
+                  <a:srgbClr val="FFFFFF"/>
+                </a:solidFill>
+              </a:defRPr>
+            </a:pPr>
+            <a:r>
+              <a:t>7. Implementation &amp; Optimization</a:t>
+            </a:r>
+          </a:p>
+        </p:txBody>
+      </p:sp>
+      <p:sp>
+        <p:nvSpPr>
+          <p:cNvPr id="4" name="TextBox 3"/>
+          <p:cNvSpPr txBox="1"/>
+          <p:nvPr/>
+        </p:nvSpPr>
+        <p:spPr>
+          <a:xfrm>
+            <a:off x="640080" y="1371600"/>
+            <a:ext cx="10972800" cy="5029200"/>
+          </a:xfrm>
+          <a:prstGeom prst="rect">
+            <a:avLst/>
+          </a:prstGeom>
+          <a:noFill/>
+        </p:spPr>
+        <p:txBody>
+          <a:bodyPr wrap="square">
+            <a:spAutoFit/>
+          </a:bodyPr>
+          <a:lstStyle/>
+          <a:p>
+            <a:pPr>
+              <a:spcBef>
+                <a:spcPts val="800"/>
+              </a:spcBef>
+              <a:defRPr sz="2400">
+                <a:solidFill>
+                  <a:srgbClr val="202020"/>
+                </a:solidFill>
+              </a:defRPr>
+            </a:pPr>
+            <a:r>
+              <a:t>Pipeline: PyTorch/MXNet -&gt; ONNX -&gt; TensorRT</a:t>
+            </a:r>
+          </a:p>
+          <a:p>
+            <a:pPr>
+              <a:spcBef>
+                <a:spcPts val="800"/>
+              </a:spcBef>
+              <a:defRPr sz="2400">
+                <a:solidFill>
+                  <a:srgbClr val="202020"/>
+                </a:solidFill>
+              </a:defRPr>
+            </a:pPr>
+            <a:r>
+              <a:t>TensorRT optimizations:</a:t>
+            </a:r>
+          </a:p>
+          <a:p>
+            <a:pPr>
+              <a:spcBef>
+                <a:spcPts val="800"/>
+              </a:spcBef>
+              <a:defRPr sz="2000">
+                <a:solidFill>
+                  <a:srgbClr val="202020"/>
+                </a:solidFill>
+              </a:defRPr>
+            </a:pPr>
+            <a:r>
+              <a:t>  - Layer Fusion: Merge kernels, reduce memory bandwidth</a:t>
+            </a:r>
+          </a:p>
+          <a:p>
+            <a:pPr>
+              <a:spcBef>
+                <a:spcPts val="800"/>
+              </a:spcBef>
+              <a:defRPr sz="2000">
+                <a:solidFill>
+                  <a:srgbClr val="202020"/>
+                </a:solidFill>
+              </a:defRPr>
+            </a:pPr>
+            <a:r>
+              <a:t>  - Precision Calibration</a:t>
+            </a:r>
+          </a:p>
+          <a:p>
+            <a:pPr>
+              <a:spcBef>
+                <a:spcPts val="800"/>
+              </a:spcBef>
+              <a:defRPr sz="2400">
+                <a:solidFill>
+                  <a:srgbClr val="202020"/>
+                </a:solidFill>
+              </a:defRPr>
+            </a:pPr>
+            <a:r>
+              <a:t>FP16 quantization:</a:t>
+            </a:r>
+          </a:p>
+          <a:p>
+            <a:pPr>
+              <a:spcBef>
+                <a:spcPts val="800"/>
+              </a:spcBef>
+              <a:defRPr sz="2000">
+                <a:solidFill>
+                  <a:srgbClr val="202020"/>
+                </a:solidFill>
+              </a:defRPr>
+            </a:pPr>
+            <a:r>
+              <a:t>  - 2-3x speedup on Jetson Nano</a:t>
+            </a:r>
+          </a:p>
+          <a:p>
+            <a:pPr>
+              <a:spcBef>
+                <a:spcPts val="800"/>
+              </a:spcBef>
+              <a:defRPr sz="2000">
+                <a:solidFill>
+                  <a:srgbClr val="202020"/>
+                </a:solidFill>
+              </a:defRPr>
+            </a:pPr>
+            <a:r>
+              <a:t>  - Key for real-time performance</a:t>
+            </a:r>
+          </a:p>
+          <a:p>
+            <a:pPr>
+              <a:spcBef>
+                <a:spcPts val="800"/>
+              </a:spcBef>
+              <a:defRPr sz="2400">
+                <a:solidFill>
+                  <a:srgbClr val="202020"/>
+                </a:solidFill>
+              </a:defRPr>
+            </a:pPr>
+            <a:r>
+              <a:t>Optimized inference pipeline, reduced latency</a:t>
+            </a:r>
+          </a:p>
+        </p:txBody>
+      </p:sp>
+      <p:sp>
+        <p:nvSpPr>
+          <p:cNvPr id="5" name="TextBox 4"/>
+          <p:cNvSpPr txBox="1"/>
+          <p:nvPr/>
+        </p:nvSpPr>
+        <p:spPr>
+          <a:xfrm>
+            <a:off x="457200" y="6400800"/>
+            <a:ext cx="11277295" cy="365760"/>
+          </a:xfrm>
+          <a:prstGeom prst="rect">
+            <a:avLst/>
+          </a:prstGeom>
+          <a:noFill/>
+        </p:spPr>
+        <p:txBody>
+          <a:bodyPr wrap="none">
+            <a:spAutoFit/>
+          </a:bodyPr>
+          <a:lstStyle/>
+          <a:p>
+            <a:pPr>
+              <a:defRPr sz="1000">
+                <a:solidFill>
+                  <a:srgbClr val="808080"/>
+                </a:solidFill>
+              </a:defRPr>
+            </a:pPr>
+            <a:r>
+              <a:t>Face Recognition | SUSTech | Tang, Li, Yang, Zhu, Wei</a:t>
+            </a:r>
+          </a:p>
+        </p:txBody>
+      </p:sp>
+    </p:spTree>
+  </p:cSld>
+  <p:clrMapOvr>
+    <a:masterClrMapping/>
+  </p:clrMapOvr>
+</p:sld>
+</file>
+
+<file path=ppt/slides/slide17.xml><?xml version="1.0" encoding="utf-8"?>
+<p:sld xmlns:a="http://schemas.openxmlformats.org/drawingml/2006/main" xmlns:p="http://schemas.openxmlformats.org/presentationml/2006/main" xmlns:r="http://schemas.openxmlformats.org/officeDocument/2006/relationships">
+  <p:cSld>
+    <p:spTree>
+      <p:nvGrpSpPr>
+        <p:cNvPr id="1" name=""/>
+        <p:cNvGrpSpPr/>
+        <p:nvPr/>
+      </p:nvGrpSpPr>
+      <p:grpSpPr/>
+      <p:sp>
+        <p:nvSpPr>
+          <p:cNvPr id="2" name="Rectangle 1"/>
+          <p:cNvSpPr/>
+          <p:nvPr/>
+        </p:nvSpPr>
+        <p:spPr>
+          <a:xfrm>
+            <a:off x="0" y="0"/>
+            <a:ext cx="12191695" cy="1097280"/>
+          </a:xfrm>
+          <a:prstGeom prst="rect">
+            <a:avLst/>
+          </a:prstGeom>
+          <a:solidFill>
+            <a:srgbClr val="003366"/>
+          </a:solidFill>
+          <a:ln>
+            <a:noFill/>
+          </a:ln>
+        </p:spPr>
+        <p:style>
+          <a:lnRef idx="1">
+            <a:schemeClr val="accent1"/>
+          </a:lnRef>
+          <a:fillRef idx="3">
+            <a:schemeClr val="accent1"/>
+          </a:fillRef>
+          <a:effectRef idx="2">
+            <a:schemeClr val="accent1"/>
+          </a:effectRef>
+          <a:fontRef idx="minor">
+            <a:schemeClr val="lt1"/>
+          </a:fontRef>
+        </p:style>
+        <p:txBody>
+          <a:bodyPr rtlCol="0" anchor="ctr"/>
+          <a:lstStyle/>
+          <a:p>
+            <a:pPr algn="ctr"/>
+          </a:p>
+        </p:txBody>
+      </p:sp>
+      <p:sp>
+        <p:nvSpPr>
+          <p:cNvPr id="3" name="TextBox 2"/>
+          <p:cNvSpPr txBox="1"/>
+          <p:nvPr/>
+        </p:nvSpPr>
+        <p:spPr>
+          <a:xfrm>
+            <a:off x="457200" y="274320"/>
+            <a:ext cx="11277295" cy="731520"/>
+          </a:xfrm>
+          <a:prstGeom prst="rect">
+            <a:avLst/>
+          </a:prstGeom>
+          <a:noFill/>
+        </p:spPr>
+        <p:txBody>
+          <a:bodyPr wrap="none">
+            <a:spAutoFit/>
+          </a:bodyPr>
+          <a:lstStyle/>
+          <a:p>
+            <a:pPr>
+              <a:defRPr sz="3200" b="1">
+                <a:solidFill>
+                  <a:srgbClr val="FFFFFF"/>
+                </a:solidFill>
+              </a:defRPr>
+            </a:pPr>
+            <a:r>
+              <a:t>8. Experiments</a:t>
+            </a:r>
+          </a:p>
+        </p:txBody>
+      </p:sp>
+      <p:sp>
+        <p:nvSpPr>
+          <p:cNvPr id="4" name="TextBox 3"/>
+          <p:cNvSpPr txBox="1"/>
+          <p:nvPr/>
+        </p:nvSpPr>
+        <p:spPr>
+          <a:xfrm>
+            <a:off x="640080" y="1371600"/>
+            <a:ext cx="10972800" cy="5029200"/>
+          </a:xfrm>
+          <a:prstGeom prst="rect">
+            <a:avLst/>
+          </a:prstGeom>
+          <a:noFill/>
+        </p:spPr>
+        <p:txBody>
+          <a:bodyPr wrap="square">
+            <a:spAutoFit/>
+          </a:bodyPr>
+          <a:lstStyle/>
+          <a:p>
+            <a:pPr>
+              <a:spcBef>
+                <a:spcPts val="800"/>
+              </a:spcBef>
+              <a:defRPr sz="2400">
+                <a:solidFill>
+                  <a:srgbClr val="202020"/>
+                </a:solidFill>
+              </a:defRPr>
+            </a:pPr>
+            <a:r>
+              <a:t>Platform: NVIDIA Jetson Nano</a:t>
+            </a:r>
+          </a:p>
+          <a:p>
+            <a:pPr>
+              <a:spcBef>
+                <a:spcPts val="800"/>
+              </a:spcBef>
+              <a:defRPr sz="2000">
+                <a:solidFill>
+                  <a:srgbClr val="202020"/>
+                </a:solidFill>
+              </a:defRPr>
+            </a:pPr>
+            <a:r>
+              <a:t>  - 128-core Maxwell GPU, limited resources</a:t>
+            </a:r>
+          </a:p>
+          <a:p>
+            <a:pPr>
+              <a:spcBef>
+                <a:spcPts val="800"/>
+              </a:spcBef>
+              <a:defRPr sz="2400">
+                <a:solidFill>
+                  <a:srgbClr val="202020"/>
+                </a:solidFill>
+              </a:defRPr>
+            </a:pPr>
+            <a:r>
+              <a:t>Metrics:</a:t>
+            </a:r>
+          </a:p>
+          <a:p>
+            <a:pPr>
+              <a:spcBef>
+                <a:spcPts val="800"/>
+              </a:spcBef>
+              <a:defRPr sz="2000">
+                <a:solidFill>
+                  <a:srgbClr val="202020"/>
+                </a:solidFill>
+              </a:defRPr>
+            </a:pPr>
+            <a:r>
+              <a:t>  - Face detection accuracy</a:t>
+            </a:r>
+          </a:p>
+          <a:p>
+            <a:pPr>
+              <a:spcBef>
+                <a:spcPts val="800"/>
+              </a:spcBef>
+              <a:defRPr sz="2000">
+                <a:solidFill>
+                  <a:srgbClr val="202020"/>
+                </a:solidFill>
+              </a:defRPr>
+            </a:pPr>
+            <a:r>
+              <a:t>  - Recognition accuracy</a:t>
+            </a:r>
+          </a:p>
+          <a:p>
+            <a:pPr>
+              <a:spcBef>
+                <a:spcPts val="800"/>
+              </a:spcBef>
+              <a:defRPr sz="2000">
+                <a:solidFill>
+                  <a:srgbClr val="202020"/>
+                </a:solidFill>
+              </a:defRPr>
+            </a:pPr>
+            <a:r>
+              <a:t>  - Inference latency, throughput</a:t>
+            </a:r>
+          </a:p>
+          <a:p>
+            <a:pPr>
+              <a:spcBef>
+                <a:spcPts val="800"/>
+              </a:spcBef>
+              <a:defRPr sz="2400">
+                <a:solidFill>
+                  <a:srgbClr val="202020"/>
+                </a:solidFill>
+              </a:defRPr>
+            </a:pPr>
+            <a:r>
+              <a:t>Complex environments: occlusion, lighting, pose</a:t>
+            </a:r>
+          </a:p>
+          <a:p>
+            <a:pPr>
+              <a:spcBef>
+                <a:spcPts val="800"/>
+              </a:spcBef>
+              <a:defRPr sz="2400">
+                <a:solidFill>
+                  <a:srgbClr val="202020"/>
+                </a:solidFill>
+              </a:defRPr>
+            </a:pPr>
+            <a:r>
+              <a:t>FP16: 2-3x speedup, maintains high accuracy</a:t>
+            </a:r>
+          </a:p>
+        </p:txBody>
+      </p:sp>
+      <p:sp>
+        <p:nvSpPr>
+          <p:cNvPr id="5" name="TextBox 4"/>
+          <p:cNvSpPr txBox="1"/>
+          <p:nvPr/>
+        </p:nvSpPr>
+        <p:spPr>
+          <a:xfrm>
+            <a:off x="457200" y="6400800"/>
+            <a:ext cx="11277295" cy="365760"/>
+          </a:xfrm>
+          <a:prstGeom prst="rect">
+            <a:avLst/>
+          </a:prstGeom>
+          <a:noFill/>
+        </p:spPr>
+        <p:txBody>
+          <a:bodyPr wrap="none">
+            <a:spAutoFit/>
+          </a:bodyPr>
+          <a:lstStyle/>
+          <a:p>
+            <a:pPr>
+              <a:defRPr sz="1000">
+                <a:solidFill>
+                  <a:srgbClr val="808080"/>
+                </a:solidFill>
+              </a:defRPr>
+            </a:pPr>
+            <a:r>
+              <a:t>Face Recognition | SUSTech | Tang, Li, Yang, Zhu, Wei</a:t>
+            </a:r>
+          </a:p>
+        </p:txBody>
+      </p:sp>
+    </p:spTree>
+  </p:cSld>
+  <p:clrMapOvr>
+    <a:masterClrMapping/>
+  </p:clrMapOvr>
+</p:sld>
+</file>
+
+<file path=ppt/slides/slide18.xml><?xml version="1.0" encoding="utf-8"?>
+<p:sld xmlns:a="http://schemas.openxmlformats.org/drawingml/2006/main" xmlns:p="http://schemas.openxmlformats.org/presentationml/2006/main" xmlns:r="http://schemas.openxmlformats.org/officeDocument/2006/relationships">
+  <p:cSld>
+    <p:spTree>
+      <p:nvGrpSpPr>
+        <p:cNvPr id="1" name=""/>
+        <p:cNvGrpSpPr/>
+        <p:nvPr/>
+      </p:nvGrpSpPr>
+      <p:grpSpPr/>
+      <p:sp>
+        <p:nvSpPr>
+          <p:cNvPr id="2" name="Rectangle 1"/>
+          <p:cNvSpPr/>
+          <p:nvPr/>
+        </p:nvSpPr>
+        <p:spPr>
+          <a:xfrm>
+            <a:off x="0" y="0"/>
+            <a:ext cx="12191695" cy="1097280"/>
+          </a:xfrm>
+          <a:prstGeom prst="rect">
+            <a:avLst/>
+          </a:prstGeom>
+          <a:solidFill>
+            <a:srgbClr val="003366"/>
+          </a:solidFill>
+          <a:ln>
+            <a:noFill/>
+          </a:ln>
+        </p:spPr>
+        <p:style>
+          <a:lnRef idx="1">
+            <a:schemeClr val="accent1"/>
+          </a:lnRef>
+          <a:fillRef idx="3">
+            <a:schemeClr val="accent1"/>
+          </a:fillRef>
+          <a:effectRef idx="2">
+            <a:schemeClr val="accent1"/>
+          </a:effectRef>
+          <a:fontRef idx="minor">
+            <a:schemeClr val="lt1"/>
+          </a:fontRef>
+        </p:style>
+        <p:txBody>
+          <a:bodyPr rtlCol="0" anchor="ctr"/>
+          <a:lstStyle/>
+          <a:p>
+            <a:pPr algn="ctr"/>
+          </a:p>
+        </p:txBody>
+      </p:sp>
+      <p:sp>
+        <p:nvSpPr>
+          <p:cNvPr id="3" name="TextBox 2"/>
+          <p:cNvSpPr txBox="1"/>
+          <p:nvPr/>
+        </p:nvSpPr>
+        <p:spPr>
+          <a:xfrm>
+            <a:off x="457200" y="274320"/>
+            <a:ext cx="11277295" cy="731520"/>
+          </a:xfrm>
+          <a:prstGeom prst="rect">
+            <a:avLst/>
+          </a:prstGeom>
+          <a:noFill/>
+        </p:spPr>
+        <p:txBody>
+          <a:bodyPr wrap="none">
+            <a:spAutoFit/>
+          </a:bodyPr>
+          <a:lstStyle/>
+          <a:p>
+            <a:pPr>
+              <a:defRPr sz="3200" b="1">
+                <a:solidFill>
+                  <a:srgbClr val="FFFFFF"/>
+                </a:solidFill>
+              </a:defRPr>
+            </a:pPr>
+            <a:r>
+              <a:t>9. Summary</a:t>
+            </a:r>
+          </a:p>
+        </p:txBody>
+      </p:sp>
+      <p:sp>
+        <p:nvSpPr>
+          <p:cNvPr id="4" name="TextBox 3"/>
+          <p:cNvSpPr txBox="1"/>
+          <p:nvPr/>
+        </p:nvSpPr>
+        <p:spPr>
+          <a:xfrm>
+            <a:off x="640080" y="1371600"/>
+            <a:ext cx="10972800" cy="5029200"/>
+          </a:xfrm>
+          <a:prstGeom prst="rect">
+            <a:avLst/>
+          </a:prstGeom>
+          <a:noFill/>
+        </p:spPr>
+        <p:txBody>
+          <a:bodyPr wrap="square">
+            <a:spAutoFit/>
+          </a:bodyPr>
+          <a:lstStyle/>
+          <a:p>
+            <a:pPr>
+              <a:spcBef>
+                <a:spcPts val="800"/>
+              </a:spcBef>
+              <a:defRPr sz="2400">
+                <a:solidFill>
+                  <a:srgbClr val="202020"/>
+                </a:solidFill>
+              </a:defRPr>
+            </a:pPr>
+            <a:r>
+              <a:t>Efficient, high-accuracy embedded face recognition</a:t>
+            </a:r>
+          </a:p>
+          <a:p>
+            <a:pPr>
+              <a:spcBef>
+                <a:spcPts val="800"/>
+              </a:spcBef>
+              <a:defRPr sz="2400">
+                <a:solidFill>
+                  <a:srgbClr val="202020"/>
+                </a:solidFill>
+              </a:defRPr>
+            </a:pPr>
+            <a:r>
+              <a:t>Stack: InsightFace + RetinaFace + ArcFace + TensorRT</a:t>
+            </a:r>
+          </a:p>
+          <a:p>
+            <a:pPr>
+              <a:spcBef>
+                <a:spcPts val="800"/>
+              </a:spcBef>
+              <a:defRPr sz="2400">
+                <a:solidFill>
+                  <a:srgbClr val="202020"/>
+                </a:solidFill>
+              </a:defRPr>
+            </a:pPr>
+            <a:r>
+              <a:t>Achievements:</a:t>
+            </a:r>
+          </a:p>
+          <a:p>
+            <a:pPr>
+              <a:spcBef>
+                <a:spcPts val="800"/>
+              </a:spcBef>
+              <a:defRPr sz="2000">
+                <a:solidFill>
+                  <a:srgbClr val="202020"/>
+                </a:solidFill>
+              </a:defRPr>
+            </a:pPr>
+            <a:r>
+              <a:t>  - Single-stage detector for efficient localization</a:t>
+            </a:r>
+          </a:p>
+          <a:p>
+            <a:pPr>
+              <a:spcBef>
+                <a:spcPts val="800"/>
+              </a:spcBef>
+              <a:defRPr sz="2000">
+                <a:solidFill>
+                  <a:srgbClr val="202020"/>
+                </a:solidFill>
+              </a:defRPr>
+            </a:pPr>
+            <a:r>
+              <a:t>  - ArcFace angular margin learns discriminative features</a:t>
+            </a:r>
+          </a:p>
+          <a:p>
+            <a:pPr>
+              <a:spcBef>
+                <a:spcPts val="800"/>
+              </a:spcBef>
+              <a:defRPr sz="2000">
+                <a:solidFill>
+                  <a:srgbClr val="202020"/>
+                </a:solidFill>
+              </a:defRPr>
+            </a:pPr>
+            <a:r>
+              <a:t>  - TensorRT FP16 enables real-time edge deployment</a:t>
+            </a:r>
+          </a:p>
+        </p:txBody>
+      </p:sp>
+      <p:sp>
+        <p:nvSpPr>
+          <p:cNvPr id="5" name="TextBox 4"/>
+          <p:cNvSpPr txBox="1"/>
+          <p:nvPr/>
+        </p:nvSpPr>
+        <p:spPr>
+          <a:xfrm>
+            <a:off x="457200" y="6400800"/>
+            <a:ext cx="11277295" cy="365760"/>
+          </a:xfrm>
+          <a:prstGeom prst="rect">
+            <a:avLst/>
+          </a:prstGeom>
+          <a:noFill/>
+        </p:spPr>
+        <p:txBody>
+          <a:bodyPr wrap="none">
+            <a:spAutoFit/>
+          </a:bodyPr>
+          <a:lstStyle/>
+          <a:p>
+            <a:pPr>
+              <a:defRPr sz="1000">
+                <a:solidFill>
+                  <a:srgbClr val="808080"/>
+                </a:solidFill>
+              </a:defRPr>
+            </a:pPr>
+            <a:r>
+              <a:t>Face Recognition | SUSTech | Tang, Li, Yang, Zhu, Wei</a:t>
+            </a:r>
+          </a:p>
+        </p:txBody>
+      </p:sp>
+    </p:spTree>
+  </p:cSld>
+  <p:clrMapOvr>
+    <a:masterClrMapping/>
+  </p:clrMapOvr>
+</p:sld>
+</file>
+
+<file path=ppt/slides/slide19.xml><?xml version="1.0" encoding="utf-8"?>
+<p:sld xmlns:a="http://schemas.openxmlformats.org/drawingml/2006/main" xmlns:p="http://schemas.openxmlformats.org/presentationml/2006/main" xmlns:r="http://schemas.openxmlformats.org/officeDocument/2006/relationships">
+  <p:cSld>
+    <p:spTree>
+      <p:nvGrpSpPr>
+        <p:cNvPr id="1" name=""/>
+        <p:cNvGrpSpPr/>
+        <p:nvPr/>
+      </p:nvGrpSpPr>
+      <p:grpSpPr/>
+      <p:sp>
+        <p:nvSpPr>
+          <p:cNvPr id="2" name="Rectangle 1"/>
+          <p:cNvSpPr/>
+          <p:nvPr/>
+        </p:nvSpPr>
+        <p:spPr>
+          <a:xfrm>
+            <a:off x="0" y="0"/>
+            <a:ext cx="12191695" cy="1097280"/>
+          </a:xfrm>
+          <a:prstGeom prst="rect">
+            <a:avLst/>
+          </a:prstGeom>
+          <a:solidFill>
+            <a:srgbClr val="003366"/>
+          </a:solidFill>
+          <a:ln>
+            <a:noFill/>
+          </a:ln>
+        </p:spPr>
+        <p:style>
+          <a:lnRef idx="1">
+            <a:schemeClr val="accent1"/>
+          </a:lnRef>
+          <a:fillRef idx="3">
+            <a:schemeClr val="accent1"/>
+          </a:fillRef>
+          <a:effectRef idx="2">
+            <a:schemeClr val="accent1"/>
+          </a:effectRef>
+          <a:fontRef idx="minor">
+            <a:schemeClr val="lt1"/>
+          </a:fontRef>
+        </p:style>
+        <p:txBody>
+          <a:bodyPr rtlCol="0" anchor="ctr"/>
+          <a:lstStyle/>
+          <a:p>
+            <a:pPr algn="ctr"/>
+          </a:p>
+        </p:txBody>
+      </p:sp>
+      <p:sp>
+        <p:nvSpPr>
+          <p:cNvPr id="3" name="TextBox 2"/>
+          <p:cNvSpPr txBox="1"/>
+          <p:nvPr/>
+        </p:nvSpPr>
+        <p:spPr>
+          <a:xfrm>
+            <a:off x="457200" y="274320"/>
+            <a:ext cx="11277295" cy="731520"/>
+          </a:xfrm>
+          <a:prstGeom prst="rect">
+            <a:avLst/>
+          </a:prstGeom>
+          <a:noFill/>
+        </p:spPr>
+        <p:txBody>
+          <a:bodyPr wrap="none">
+            <a:spAutoFit/>
+          </a:bodyPr>
+          <a:lstStyle/>
+          <a:p>
+            <a:pPr>
+              <a:defRPr sz="3200" b="1">
+                <a:solidFill>
+                  <a:srgbClr val="FFFFFF"/>
+                </a:solidFill>
+              </a:defRPr>
+            </a:pPr>
+            <a:r>
+              <a:t>Future Work</a:t>
+            </a:r>
+          </a:p>
+        </p:txBody>
+      </p:sp>
+      <p:sp>
+        <p:nvSpPr>
+          <p:cNvPr id="4" name="TextBox 3"/>
+          <p:cNvSpPr txBox="1"/>
+          <p:nvPr/>
+        </p:nvSpPr>
+        <p:spPr>
+          <a:xfrm>
+            <a:off x="640080" y="1371600"/>
+            <a:ext cx="10972800" cy="5029200"/>
+          </a:xfrm>
+          <a:prstGeom prst="rect">
+            <a:avLst/>
+          </a:prstGeom>
+          <a:noFill/>
+        </p:spPr>
+        <p:txBody>
+          <a:bodyPr wrap="square">
+            <a:spAutoFit/>
+          </a:bodyPr>
+          <a:lstStyle/>
+          <a:p>
+            <a:pPr>
+              <a:spcBef>
+                <a:spcPts val="800"/>
+              </a:spcBef>
+              <a:defRPr sz="2400">
+                <a:solidFill>
+                  <a:srgbClr val="202020"/>
+                </a:solidFill>
+              </a:defRPr>
+            </a:pPr>
+            <a:r>
+              <a:t>Lightweight backbone to replace ResNet100</a:t>
+            </a:r>
+          </a:p>
+          <a:p>
+            <a:pPr>
+              <a:spcBef>
+                <a:spcPts val="800"/>
+              </a:spcBef>
+              <a:defRPr sz="2400">
+                <a:solidFill>
+                  <a:srgbClr val="202020"/>
+                </a:solidFill>
+              </a:defRPr>
+            </a:pPr>
+            <a:r>
+              <a:t>Edge collaborative inference optimization</a:t>
+            </a:r>
+          </a:p>
+          <a:p>
+            <a:pPr>
+              <a:spcBef>
+                <a:spcPts val="800"/>
+              </a:spcBef>
+              <a:defRPr sz="2400">
+                <a:solidFill>
+                  <a:srgbClr val="202020"/>
+                </a:solidFill>
+              </a:defRPr>
+            </a:pPr>
+            <a:r>
+              <a:t>Multi-modal fusion (face + voice + gait)</a:t>
+            </a:r>
+          </a:p>
+          <a:p>
+            <a:pPr>
+              <a:spcBef>
+                <a:spcPts val="800"/>
+              </a:spcBef>
+              <a:defRPr sz="2400">
+                <a:solidFill>
+                  <a:srgbClr val="202020"/>
+                </a:solidFill>
+              </a:defRPr>
+            </a:pPr>
+            <a:r>
+              <a:t>Privacy-preserving (federated learning, differential privacy)</a:t>
+            </a:r>
+          </a:p>
+          <a:p>
+            <a:pPr>
+              <a:spcBef>
+                <a:spcPts val="800"/>
+              </a:spcBef>
+              <a:defRPr sz="2400">
+                <a:solidFill>
+                  <a:srgbClr val="202020"/>
+                </a:solidFill>
+              </a:defRPr>
+            </a:pPr>
+            <a:r>
+              <a:t>More edge devices (Jetson Xavier, Coral, etc.)</a:t>
             </a:r>
           </a:p>
         </p:txBody>
@@ -4700,7 +5922,7 @@
               </a:defRPr>
             </a:pPr>
             <a:r>
-              <a:t>目录</a:t>
+              <a:t>Contents</a:t>
             </a:r>
           </a:p>
         </p:txBody>
@@ -4729,91 +5951,666 @@
           <a:p>
             <a:pPr>
               <a:spcBef>
-                <a:spcPts val="1200"/>
-              </a:spcBef>
-              <a:defRPr sz="2400">
-                <a:solidFill>
-                  <a:srgbClr val="202020"/>
-                </a:solidFill>
-              </a:defRPr>
-            </a:pPr>
-            <a:r>
-              <a:t>• 项目介绍</a:t>
-            </a:r>
-          </a:p>
-          <a:p>
-            <a:pPr>
-              <a:spcBef>
-                <a:spcPts val="1200"/>
-              </a:spcBef>
-              <a:defRPr sz="2400">
-                <a:solidFill>
-                  <a:srgbClr val="202020"/>
-                </a:solidFill>
-              </a:defRPr>
-            </a:pPr>
-            <a:r>
-              <a:t>• 相关工作</a:t>
-            </a:r>
-          </a:p>
-          <a:p>
-            <a:pPr>
-              <a:spcBef>
-                <a:spcPts val="1200"/>
-              </a:spcBef>
-              <a:defRPr sz="2400">
-                <a:solidFill>
-                  <a:srgbClr val="202020"/>
-                </a:solidFill>
-              </a:defRPr>
-            </a:pPr>
-            <a:r>
-              <a:t>• InsightFace算法详解</a:t>
-            </a:r>
-          </a:p>
-          <a:p>
-            <a:pPr>
-              <a:spcBef>
-                <a:spcPts val="1200"/>
-              </a:spcBef>
-              <a:defRPr sz="2400">
-                <a:solidFill>
-                  <a:srgbClr val="202020"/>
-                </a:solidFill>
-              </a:defRPr>
-            </a:pPr>
-            <a:r>
-              <a:t>• 系统实现与优化</a:t>
-            </a:r>
-          </a:p>
-          <a:p>
-            <a:pPr>
-              <a:spcBef>
-                <a:spcPts val="1200"/>
-              </a:spcBef>
-              <a:defRPr sz="2400">
-                <a:solidFill>
-                  <a:srgbClr val="202020"/>
-                </a:solidFill>
-              </a:defRPr>
-            </a:pPr>
-            <a:r>
-              <a:t>• 实验与评估</a:t>
-            </a:r>
-          </a:p>
-          <a:p>
-            <a:pPr>
-              <a:spcBef>
-                <a:spcPts val="1200"/>
-              </a:spcBef>
-              <a:defRPr sz="2400">
-                <a:solidFill>
-                  <a:srgbClr val="202020"/>
-                </a:solidFill>
-              </a:defRPr>
-            </a:pPr>
-            <a:r>
-              <a:t>• 总结与展望</a:t>
+                <a:spcPts val="800"/>
+              </a:spcBef>
+              <a:defRPr sz="2400">
+                <a:solidFill>
+                  <a:srgbClr val="202020"/>
+                </a:solidFill>
+              </a:defRPr>
+            </a:pPr>
+            <a:r>
+              <a:t>1. Introduction</a:t>
+            </a:r>
+          </a:p>
+          <a:p>
+            <a:pPr>
+              <a:spcBef>
+                <a:spcPts val="800"/>
+              </a:spcBef>
+              <a:defRPr sz="2400">
+                <a:solidFill>
+                  <a:srgbClr val="202020"/>
+                </a:solidFill>
+              </a:defRPr>
+            </a:pPr>
+            <a:r>
+              <a:t>2. Related Work</a:t>
+            </a:r>
+          </a:p>
+          <a:p>
+            <a:pPr>
+              <a:spcBef>
+                <a:spcPts val="800"/>
+              </a:spcBef>
+              <a:defRPr sz="2400">
+                <a:solidFill>
+                  <a:srgbClr val="202020"/>
+                </a:solidFill>
+              </a:defRPr>
+            </a:pPr>
+            <a:r>
+              <a:t>3. InsightFace Framework</a:t>
+            </a:r>
+          </a:p>
+          <a:p>
+            <a:pPr>
+              <a:spcBef>
+                <a:spcPts val="800"/>
+              </a:spcBef>
+              <a:defRPr sz="2400">
+                <a:solidFill>
+                  <a:srgbClr val="202020"/>
+                </a:solidFill>
+              </a:defRPr>
+            </a:pPr>
+            <a:r>
+              <a:t>4. Face Detection (RetinaFace)</a:t>
+            </a:r>
+          </a:p>
+          <a:p>
+            <a:pPr>
+              <a:spcBef>
+                <a:spcPts val="800"/>
+              </a:spcBef>
+              <a:defRPr sz="2400">
+                <a:solidFill>
+                  <a:srgbClr val="202020"/>
+                </a:solidFill>
+              </a:defRPr>
+            </a:pPr>
+            <a:r>
+              <a:t>5. Face Alignment</a:t>
+            </a:r>
+          </a:p>
+          <a:p>
+            <a:pPr>
+              <a:spcBef>
+                <a:spcPts val="800"/>
+              </a:spcBef>
+              <a:defRPr sz="2400">
+                <a:solidFill>
+                  <a:srgbClr val="202020"/>
+                </a:solidFill>
+              </a:defRPr>
+            </a:pPr>
+            <a:r>
+              <a:t>6. Face Recognition (ArcFace)</a:t>
+            </a:r>
+          </a:p>
+          <a:p>
+            <a:pPr>
+              <a:spcBef>
+                <a:spcPts val="800"/>
+              </a:spcBef>
+              <a:defRPr sz="2400">
+                <a:solidFill>
+                  <a:srgbClr val="202020"/>
+                </a:solidFill>
+              </a:defRPr>
+            </a:pPr>
+            <a:r>
+              <a:t>7. Implementation &amp; Optimization</a:t>
+            </a:r>
+          </a:p>
+          <a:p>
+            <a:pPr>
+              <a:spcBef>
+                <a:spcPts val="800"/>
+              </a:spcBef>
+              <a:defRPr sz="2400">
+                <a:solidFill>
+                  <a:srgbClr val="202020"/>
+                </a:solidFill>
+              </a:defRPr>
+            </a:pPr>
+            <a:r>
+              <a:t>8. Experiments</a:t>
+            </a:r>
+          </a:p>
+          <a:p>
+            <a:pPr>
+              <a:spcBef>
+                <a:spcPts val="800"/>
+              </a:spcBef>
+              <a:defRPr sz="2400">
+                <a:solidFill>
+                  <a:srgbClr val="202020"/>
+                </a:solidFill>
+              </a:defRPr>
+            </a:pPr>
+            <a:r>
+              <a:t>9. Summary &amp; Future Work</a:t>
+            </a:r>
+          </a:p>
+        </p:txBody>
+      </p:sp>
+      <p:sp>
+        <p:nvSpPr>
+          <p:cNvPr id="5" name="TextBox 4"/>
+          <p:cNvSpPr txBox="1"/>
+          <p:nvPr/>
+        </p:nvSpPr>
+        <p:spPr>
+          <a:xfrm>
+            <a:off x="457200" y="6400800"/>
+            <a:ext cx="11277295" cy="365760"/>
+          </a:xfrm>
+          <a:prstGeom prst="rect">
+            <a:avLst/>
+          </a:prstGeom>
+          <a:noFill/>
+        </p:spPr>
+        <p:txBody>
+          <a:bodyPr wrap="none">
+            <a:spAutoFit/>
+          </a:bodyPr>
+          <a:lstStyle/>
+          <a:p>
+            <a:pPr>
+              <a:defRPr sz="1000">
+                <a:solidFill>
+                  <a:srgbClr val="808080"/>
+                </a:solidFill>
+              </a:defRPr>
+            </a:pPr>
+            <a:r>
+              <a:t>Face Recognition | SUSTech | Tang, Li, Yang, Zhu, Wei</a:t>
+            </a:r>
+          </a:p>
+        </p:txBody>
+      </p:sp>
+    </p:spTree>
+  </p:cSld>
+  <p:clrMapOvr>
+    <a:masterClrMapping/>
+  </p:clrMapOvr>
+</p:sld>
+</file>
+
+<file path=ppt/slides/slide20.xml><?xml version="1.0" encoding="utf-8"?>
+<p:sld xmlns:a="http://schemas.openxmlformats.org/drawingml/2006/main" xmlns:p="http://schemas.openxmlformats.org/presentationml/2006/main" xmlns:r="http://schemas.openxmlformats.org/officeDocument/2006/relationships">
+  <p:cSld>
+    <p:spTree>
+      <p:nvGrpSpPr>
+        <p:cNvPr id="1" name=""/>
+        <p:cNvGrpSpPr/>
+        <p:nvPr/>
+      </p:nvGrpSpPr>
+      <p:grpSpPr/>
+      <p:sp>
+        <p:nvSpPr>
+          <p:cNvPr id="2" name="Rectangle 1"/>
+          <p:cNvSpPr/>
+          <p:nvPr/>
+        </p:nvSpPr>
+        <p:spPr>
+          <a:xfrm>
+            <a:off x="0" y="0"/>
+            <a:ext cx="12191695" cy="1097280"/>
+          </a:xfrm>
+          <a:prstGeom prst="rect">
+            <a:avLst/>
+          </a:prstGeom>
+          <a:solidFill>
+            <a:srgbClr val="003366"/>
+          </a:solidFill>
+          <a:ln>
+            <a:noFill/>
+          </a:ln>
+        </p:spPr>
+        <p:style>
+          <a:lnRef idx="1">
+            <a:schemeClr val="accent1"/>
+          </a:lnRef>
+          <a:fillRef idx="3">
+            <a:schemeClr val="accent1"/>
+          </a:fillRef>
+          <a:effectRef idx="2">
+            <a:schemeClr val="accent1"/>
+          </a:effectRef>
+          <a:fontRef idx="minor">
+            <a:schemeClr val="lt1"/>
+          </a:fontRef>
+        </p:style>
+        <p:txBody>
+          <a:bodyPr rtlCol="0" anchor="ctr"/>
+          <a:lstStyle/>
+          <a:p>
+            <a:pPr algn="ctr"/>
+          </a:p>
+        </p:txBody>
+      </p:sp>
+      <p:sp>
+        <p:nvSpPr>
+          <p:cNvPr id="3" name="TextBox 2"/>
+          <p:cNvSpPr txBox="1"/>
+          <p:nvPr/>
+        </p:nvSpPr>
+        <p:spPr>
+          <a:xfrm>
+            <a:off x="457200" y="274320"/>
+            <a:ext cx="11277295" cy="731520"/>
+          </a:xfrm>
+          <a:prstGeom prst="rect">
+            <a:avLst/>
+          </a:prstGeom>
+          <a:noFill/>
+        </p:spPr>
+        <p:txBody>
+          <a:bodyPr wrap="none">
+            <a:spAutoFit/>
+          </a:bodyPr>
+          <a:lstStyle/>
+          <a:p>
+            <a:pPr>
+              <a:defRPr sz="3200" b="1">
+                <a:solidFill>
+                  <a:srgbClr val="FFFFFF"/>
+                </a:solidFill>
+              </a:defRPr>
+            </a:pPr>
+            <a:r>
+              <a:t>References</a:t>
+            </a:r>
+          </a:p>
+        </p:txBody>
+      </p:sp>
+      <p:sp>
+        <p:nvSpPr>
+          <p:cNvPr id="4" name="TextBox 3"/>
+          <p:cNvSpPr txBox="1"/>
+          <p:nvPr/>
+        </p:nvSpPr>
+        <p:spPr>
+          <a:xfrm>
+            <a:off x="640080" y="1371600"/>
+            <a:ext cx="10972800" cy="5029200"/>
+          </a:xfrm>
+          <a:prstGeom prst="rect">
+            <a:avLst/>
+          </a:prstGeom>
+          <a:noFill/>
+        </p:spPr>
+        <p:txBody>
+          <a:bodyPr wrap="square">
+            <a:spAutoFit/>
+          </a:bodyPr>
+          <a:lstStyle/>
+          <a:p>
+            <a:pPr>
+              <a:spcBef>
+                <a:spcPts val="800"/>
+              </a:spcBef>
+              <a:defRPr sz="2400">
+                <a:solidFill>
+                  <a:srgbClr val="202020"/>
+                </a:solidFill>
+              </a:defRPr>
+            </a:pPr>
+            <a:r>
+              <a:t>[1] Viola-Jones. Robust Real-time Object Detection. IJCV 2004</a:t>
+            </a:r>
+          </a:p>
+          <a:p>
+            <a:pPr>
+              <a:spcBef>
+                <a:spcPts val="800"/>
+              </a:spcBef>
+              <a:defRPr sz="2400">
+                <a:solidFill>
+                  <a:srgbClr val="202020"/>
+                </a:solidFill>
+              </a:defRPr>
+            </a:pPr>
+            <a:r>
+              <a:t>[2] Zhang et al. MTCNN. 2016</a:t>
+            </a:r>
+          </a:p>
+          <a:p>
+            <a:pPr>
+              <a:spcBef>
+                <a:spcPts val="800"/>
+              </a:spcBef>
+              <a:defRPr sz="2400">
+                <a:solidFill>
+                  <a:srgbClr val="202020"/>
+                </a:solidFill>
+              </a:defRPr>
+            </a:pPr>
+            <a:r>
+              <a:t>[3] Deng et al. RetinaFace. CVPR 2020</a:t>
+            </a:r>
+          </a:p>
+          <a:p>
+            <a:pPr>
+              <a:spcBef>
+                <a:spcPts val="800"/>
+              </a:spcBef>
+              <a:defRPr sz="2400">
+                <a:solidFill>
+                  <a:srgbClr val="202020"/>
+                </a:solidFill>
+              </a:defRPr>
+            </a:pPr>
+            <a:r>
+              <a:t>[4] Schroff et al. FaceNet. CVPR 2015</a:t>
+            </a:r>
+          </a:p>
+          <a:p>
+            <a:pPr>
+              <a:spcBef>
+                <a:spcPts val="800"/>
+              </a:spcBef>
+              <a:defRPr sz="2400">
+                <a:solidFill>
+                  <a:srgbClr val="202020"/>
+                </a:solidFill>
+              </a:defRPr>
+            </a:pPr>
+            <a:r>
+              <a:t>[5] Liu et al. SphereFace. CVPR 2017</a:t>
+            </a:r>
+          </a:p>
+          <a:p>
+            <a:pPr>
+              <a:spcBef>
+                <a:spcPts val="800"/>
+              </a:spcBef>
+              <a:defRPr sz="2400">
+                <a:solidFill>
+                  <a:srgbClr val="202020"/>
+                </a:solidFill>
+              </a:defRPr>
+            </a:pPr>
+            <a:r>
+              <a:t>[6] Wang et al. CosFace. CVPR 2018</a:t>
+            </a:r>
+          </a:p>
+          <a:p>
+            <a:pPr>
+              <a:spcBef>
+                <a:spcPts val="800"/>
+              </a:spcBef>
+              <a:defRPr sz="2400">
+                <a:solidFill>
+                  <a:srgbClr val="202020"/>
+                </a:solidFill>
+              </a:defRPr>
+            </a:pPr>
+            <a:r>
+              <a:t>[7] Deng et al. ArcFace. CVPR 2019</a:t>
+            </a:r>
+          </a:p>
+          <a:p>
+            <a:pPr>
+              <a:spcBef>
+                <a:spcPts val="800"/>
+              </a:spcBef>
+              <a:defRPr sz="2400">
+                <a:solidFill>
+                  <a:srgbClr val="202020"/>
+                </a:solidFill>
+              </a:defRPr>
+            </a:pPr>
+            <a:r>
+              <a:t>[8] He et al. Deep Residual Learning. CVPR 2016</a:t>
+            </a:r>
+          </a:p>
+          <a:p>
+            <a:pPr>
+              <a:spcBef>
+                <a:spcPts val="800"/>
+              </a:spcBef>
+              <a:defRPr sz="2400">
+                <a:solidFill>
+                  <a:srgbClr val="202020"/>
+                </a:solidFill>
+              </a:defRPr>
+            </a:pPr>
+            <a:r>
+              <a:t>[9] InsightFace: github.com/deepinsight/insightface</a:t>
+            </a:r>
+          </a:p>
+        </p:txBody>
+      </p:sp>
+      <p:sp>
+        <p:nvSpPr>
+          <p:cNvPr id="5" name="TextBox 4"/>
+          <p:cNvSpPr txBox="1"/>
+          <p:nvPr/>
+        </p:nvSpPr>
+        <p:spPr>
+          <a:xfrm>
+            <a:off x="457200" y="6400800"/>
+            <a:ext cx="11277295" cy="365760"/>
+          </a:xfrm>
+          <a:prstGeom prst="rect">
+            <a:avLst/>
+          </a:prstGeom>
+          <a:noFill/>
+        </p:spPr>
+        <p:txBody>
+          <a:bodyPr wrap="none">
+            <a:spAutoFit/>
+          </a:bodyPr>
+          <a:lstStyle/>
+          <a:p>
+            <a:pPr>
+              <a:defRPr sz="1000">
+                <a:solidFill>
+                  <a:srgbClr val="808080"/>
+                </a:solidFill>
+              </a:defRPr>
+            </a:pPr>
+            <a:r>
+              <a:t>Face Recognition | SUSTech | Tang, Li, Yang, Zhu, Wei</a:t>
+            </a:r>
+          </a:p>
+        </p:txBody>
+      </p:sp>
+    </p:spTree>
+  </p:cSld>
+  <p:clrMapOvr>
+    <a:masterClrMapping/>
+  </p:clrMapOvr>
+</p:sld>
+</file>
+
+<file path=ppt/slides/slide21.xml><?xml version="1.0" encoding="utf-8"?>
+<p:sld xmlns:a="http://schemas.openxmlformats.org/drawingml/2006/main" xmlns:p="http://schemas.openxmlformats.org/presentationml/2006/main" xmlns:r="http://schemas.openxmlformats.org/officeDocument/2006/relationships">
+  <p:cSld>
+    <p:spTree>
+      <p:nvGrpSpPr>
+        <p:cNvPr id="1" name=""/>
+        <p:cNvGrpSpPr/>
+        <p:nvPr/>
+      </p:nvGrpSpPr>
+      <p:grpSpPr/>
+      <p:sp>
+        <p:nvSpPr>
+          <p:cNvPr id="2" name="Rectangle 1"/>
+          <p:cNvSpPr/>
+          <p:nvPr/>
+        </p:nvSpPr>
+        <p:spPr>
+          <a:xfrm>
+            <a:off x="0" y="0"/>
+            <a:ext cx="12191695" cy="1097280"/>
+          </a:xfrm>
+          <a:prstGeom prst="rect">
+            <a:avLst/>
+          </a:prstGeom>
+          <a:solidFill>
+            <a:srgbClr val="003366"/>
+          </a:solidFill>
+          <a:ln>
+            <a:noFill/>
+          </a:ln>
+        </p:spPr>
+        <p:style>
+          <a:lnRef idx="1">
+            <a:schemeClr val="accent1"/>
+          </a:lnRef>
+          <a:fillRef idx="3">
+            <a:schemeClr val="accent1"/>
+          </a:fillRef>
+          <a:effectRef idx="2">
+            <a:schemeClr val="accent1"/>
+          </a:effectRef>
+          <a:fontRef idx="minor">
+            <a:schemeClr val="lt1"/>
+          </a:fontRef>
+        </p:style>
+        <p:txBody>
+          <a:bodyPr rtlCol="0" anchor="ctr"/>
+          <a:lstStyle/>
+          <a:p>
+            <a:pPr algn="ctr"/>
+          </a:p>
+        </p:txBody>
+      </p:sp>
+      <p:sp>
+        <p:nvSpPr>
+          <p:cNvPr id="3" name="TextBox 2"/>
+          <p:cNvSpPr txBox="1"/>
+          <p:nvPr/>
+        </p:nvSpPr>
+        <p:spPr>
+          <a:xfrm>
+            <a:off x="457200" y="274320"/>
+            <a:ext cx="11277295" cy="731520"/>
+          </a:xfrm>
+          <a:prstGeom prst="rect">
+            <a:avLst/>
+          </a:prstGeom>
+          <a:noFill/>
+        </p:spPr>
+        <p:txBody>
+          <a:bodyPr wrap="none">
+            <a:spAutoFit/>
+          </a:bodyPr>
+          <a:lstStyle/>
+          <a:p>
+            <a:pPr>
+              <a:defRPr sz="3200" b="1">
+                <a:solidFill>
+                  <a:srgbClr val="FFFFFF"/>
+                </a:solidFill>
+              </a:defRPr>
+            </a:pPr>
+            <a:r>
+              <a:t>Acknowledgements</a:t>
+            </a:r>
+          </a:p>
+        </p:txBody>
+      </p:sp>
+      <p:sp>
+        <p:nvSpPr>
+          <p:cNvPr id="4" name="TextBox 3"/>
+          <p:cNvSpPr txBox="1"/>
+          <p:nvPr/>
+        </p:nvSpPr>
+        <p:spPr>
+          <a:xfrm>
+            <a:off x="640080" y="1371600"/>
+            <a:ext cx="10972800" cy="5029200"/>
+          </a:xfrm>
+          <a:prstGeom prst="rect">
+            <a:avLst/>
+          </a:prstGeom>
+          <a:noFill/>
+        </p:spPr>
+        <p:txBody>
+          <a:bodyPr wrap="square">
+            <a:spAutoFit/>
+          </a:bodyPr>
+          <a:lstStyle/>
+          <a:p>
+            <a:pPr>
+              <a:spcBef>
+                <a:spcPts val="800"/>
+              </a:spcBef>
+              <a:defRPr sz="2400">
+                <a:solidFill>
+                  <a:srgbClr val="202020"/>
+                </a:solidFill>
+              </a:defRPr>
+            </a:pPr>
+            <a:r>
+              <a:t>Thanks to Southern University of Science and Technology</a:t>
+            </a:r>
+          </a:p>
+          <a:p>
+            <a:pPr>
+              <a:spcBef>
+                <a:spcPts val="800"/>
+              </a:spcBef>
+              <a:defRPr sz="2400">
+                <a:solidFill>
+                  <a:srgbClr val="202020"/>
+                </a:solidFill>
+              </a:defRPr>
+            </a:pPr>
+            <a:r>
+              <a:t>Thanks to InsightFace open-source community</a:t>
+            </a:r>
+          </a:p>
+          <a:p>
+            <a:pPr>
+              <a:spcBef>
+                <a:spcPts val="800"/>
+              </a:spcBef>
+              <a:defRPr sz="2400">
+                <a:solidFill>
+                  <a:srgbClr val="202020"/>
+                </a:solidFill>
+              </a:defRPr>
+            </a:pPr>
+            <a:r>
+              <a:t>Thanks to NVIDIA TensorRT team</a:t>
+            </a:r>
+          </a:p>
+          <a:p>
+            <a:pPr>
+              <a:spcBef>
+                <a:spcPts val="800"/>
+              </a:spcBef>
+              <a:defRPr sz="2400">
+                <a:solidFill>
+                  <a:srgbClr val="202020"/>
+                </a:solidFill>
+              </a:defRPr>
+            </a:pPr>
+          </a:p>
+          <a:p>
+            <a:pPr>
+              <a:spcBef>
+                <a:spcPts val="800"/>
+              </a:spcBef>
+              <a:defRPr sz="2400">
+                <a:solidFill>
+                  <a:srgbClr val="202020"/>
+                </a:solidFill>
+              </a:defRPr>
+            </a:pPr>
+            <a:r>
+              <a:t>Q&amp;A</a:t>
+            </a:r>
+          </a:p>
+          <a:p>
+            <a:pPr>
+              <a:spcBef>
+                <a:spcPts val="800"/>
+              </a:spcBef>
+              <a:defRPr sz="2400">
+                <a:solidFill>
+                  <a:srgbClr val="202020"/>
+                </a:solidFill>
+              </a:defRPr>
+            </a:pPr>
+            <a:r>
+              <a:t>Thank You!</a:t>
             </a:r>
           </a:p>
         </p:txBody>
@@ -4944,7 +6741,7 @@
               </a:defRPr>
             </a:pPr>
             <a:r>
-              <a:t>1. 项目介绍</a:t>
+              <a:t>1. Introduction</a:t>
             </a:r>
           </a:p>
         </p:txBody>
@@ -4973,76 +6770,91 @@
           <a:p>
             <a:pPr>
               <a:spcBef>
-                <a:spcPts val="1200"/>
-              </a:spcBef>
-              <a:defRPr sz="2400">
-                <a:solidFill>
-                  <a:srgbClr val="202020"/>
-                </a:solidFill>
-              </a:defRPr>
-            </a:pPr>
-            <a:r>
-              <a:t>• 实现基于NVIDIA Jetson Nano的边缘实时人脸识别系统</a:t>
-            </a:r>
-          </a:p>
-          <a:p>
-            <a:pPr>
-              <a:spcBef>
-                <a:spcPts val="1200"/>
-              </a:spcBef>
-              <a:defRPr sz="2400">
-                <a:solidFill>
-                  <a:srgbClr val="202020"/>
-                </a:solidFill>
-              </a:defRPr>
-            </a:pPr>
-            <a:r>
-              <a:t>• 检测：RetinaFace</a:t>
-            </a:r>
-          </a:p>
-          <a:p>
-            <a:pPr>
-              <a:spcBef>
-                <a:spcPts val="1200"/>
-              </a:spcBef>
-              <a:defRPr sz="2400">
-                <a:solidFill>
-                  <a:srgbClr val="202020"/>
-                </a:solidFill>
-              </a:defRPr>
-            </a:pPr>
-            <a:r>
-              <a:t>• 特征提取：ArcFace (ResNet100)</a:t>
-            </a:r>
-          </a:p>
-          <a:p>
-            <a:pPr>
-              <a:spcBef>
-                <a:spcPts val="1200"/>
-              </a:spcBef>
-              <a:defRPr sz="2400">
-                <a:solidFill>
-                  <a:srgbClr val="202020"/>
-                </a:solidFill>
-              </a:defRPr>
-            </a:pPr>
-            <a:r>
-              <a:t>• 加速技术：ONNX &amp; TensorRT (FP16量化)</a:t>
-            </a:r>
-          </a:p>
-          <a:p>
-            <a:pPr>
-              <a:spcBef>
-                <a:spcPts val="1200"/>
-              </a:spcBef>
-              <a:defRPr sz="2400">
-                <a:solidFill>
-                  <a:srgbClr val="202020"/>
-                </a:solidFill>
-              </a:defRPr>
-            </a:pPr>
-            <a:r>
-              <a:t>• 实现高准确率与强鲁棒性的嵌入式应用</a:t>
+                <a:spcPts val="800"/>
+              </a:spcBef>
+              <a:defRPr sz="2400">
+                <a:solidFill>
+                  <a:srgbClr val="202020"/>
+                </a:solidFill>
+              </a:defRPr>
+            </a:pPr>
+            <a:r>
+              <a:t>Real-time face recognition on NVIDIA Jetson Nano (edge computing)</a:t>
+            </a:r>
+          </a:p>
+          <a:p>
+            <a:pPr>
+              <a:spcBef>
+                <a:spcPts val="800"/>
+              </a:spcBef>
+              <a:defRPr sz="2400">
+                <a:solidFill>
+                  <a:srgbClr val="202020"/>
+                </a:solidFill>
+              </a:defRPr>
+            </a:pPr>
+            <a:r>
+              <a:t>Based on InsightFace open-source framework</a:t>
+            </a:r>
+          </a:p>
+          <a:p>
+            <a:pPr>
+              <a:spcBef>
+                <a:spcPts val="800"/>
+              </a:spcBef>
+              <a:defRPr sz="2400">
+                <a:solidFill>
+                  <a:srgbClr val="202020"/>
+                </a:solidFill>
+              </a:defRPr>
+            </a:pPr>
+            <a:r>
+              <a:t>Detection: RetinaFace (single-stage dense face localization)</a:t>
+            </a:r>
+          </a:p>
+          <a:p>
+            <a:pPr>
+              <a:spcBef>
+                <a:spcPts val="800"/>
+              </a:spcBef>
+              <a:defRPr sz="2400">
+                <a:solidFill>
+                  <a:srgbClr val="202020"/>
+                </a:solidFill>
+              </a:defRPr>
+            </a:pPr>
+            <a:r>
+              <a:t>Feature Extraction: ArcFace with ResNet100 (512-D features)</a:t>
+            </a:r>
+          </a:p>
+          <a:p>
+            <a:pPr>
+              <a:spcBef>
+                <a:spcPts val="800"/>
+              </a:spcBef>
+              <a:defRPr sz="2400">
+                <a:solidFill>
+                  <a:srgbClr val="202020"/>
+                </a:solidFill>
+              </a:defRPr>
+            </a:pPr>
+            <a:r>
+              <a:t>Acceleration: ONNX + TensorRT (FP16 quantization)</a:t>
+            </a:r>
+          </a:p>
+          <a:p>
+            <a:pPr>
+              <a:spcBef>
+                <a:spcPts val="800"/>
+              </a:spcBef>
+              <a:defRPr sz="2400">
+                <a:solidFill>
+                  <a:srgbClr val="202020"/>
+                </a:solidFill>
+              </a:defRPr>
+            </a:pPr>
+            <a:r>
+              <a:t>Goal: High accuracy and robustness in complex environments</a:t>
             </a:r>
           </a:p>
         </p:txBody>
@@ -5173,7 +6985,7 @@
               </a:defRPr>
             </a:pPr>
             <a:r>
-              <a:t>2. 相关工作：人脸检测发展</a:t>
+              <a:t>Face Recognition Pipeline</a:t>
             </a:r>
           </a:p>
         </p:txBody>
@@ -5202,76 +7014,88 @@
           <a:p>
             <a:pPr>
               <a:spcBef>
-                <a:spcPts val="1200"/>
-              </a:spcBef>
-              <a:defRPr sz="2400">
-                <a:solidFill>
-                  <a:srgbClr val="202020"/>
-                </a:solidFill>
-              </a:defRPr>
-            </a:pPr>
-            <a:r>
-              <a:t>• 早期方法：Viola-Jones (Haar+AdaBoost)</a:t>
-            </a:r>
-          </a:p>
-          <a:p>
-            <a:pPr>
-              <a:spcBef>
-                <a:spcPts val="1200"/>
-              </a:spcBef>
-              <a:defRPr sz="2400">
-                <a:solidFill>
-                  <a:srgbClr val="202020"/>
-                </a:solidFill>
-              </a:defRPr>
-            </a:pPr>
-            <a:r>
-              <a:t>• 深度学习：SSD, YOLO等通用检测器移植</a:t>
-            </a:r>
-          </a:p>
-          <a:p>
-            <a:pPr>
-              <a:spcBef>
-                <a:spcPts val="1200"/>
-              </a:spcBef>
-              <a:defRPr sz="2400">
-                <a:solidFill>
-                  <a:srgbClr val="202020"/>
-                </a:solidFill>
-              </a:defRPr>
-            </a:pPr>
-            <a:r>
-              <a:t>• MTCNN (多阶段) vs. RetinaFace (单阶段)</a:t>
-            </a:r>
-          </a:p>
-          <a:p>
-            <a:pPr lvl="1">
-              <a:spcBef>
-                <a:spcPts val="600"/>
-              </a:spcBef>
-              <a:defRPr sz="2000">
-                <a:solidFill>
-                  <a:srgbClr val="202020"/>
-                </a:solidFill>
-              </a:defRPr>
-            </a:pPr>
-            <a:r>
-              <a:t>• 多任务学习同时预测人脸/关键点</a:t>
-            </a:r>
-          </a:p>
-          <a:p>
-            <a:pPr lvl="1">
-              <a:spcBef>
-                <a:spcPts val="600"/>
-              </a:spcBef>
-              <a:defRPr sz="2000">
-                <a:solidFill>
-                  <a:srgbClr val="202020"/>
-                </a:solidFill>
-              </a:defRPr>
-            </a:pPr>
-            <a:r>
-              <a:t>• FPN多尺度特征，提升复杂场景适应性</a:t>
+                <a:spcPts val="800"/>
+              </a:spcBef>
+              <a:defRPr sz="2400">
+                <a:solidFill>
+                  <a:srgbClr val="202020"/>
+                </a:solidFill>
+              </a:defRPr>
+            </a:pPr>
+            <a:r>
+              <a:t>Image -&gt; Detect -&gt; (bbox, kps) -&gt; Align -&gt; Recognize -&gt; f in R^d</a:t>
+            </a:r>
+          </a:p>
+          <a:p>
+            <a:pPr>
+              <a:spcBef>
+                <a:spcPts val="800"/>
+              </a:spcBef>
+              <a:defRPr sz="2400">
+                <a:solidFill>
+                  <a:srgbClr val="202020"/>
+                </a:solidFill>
+              </a:defRPr>
+            </a:pPr>
+          </a:p>
+          <a:p>
+            <a:pPr>
+              <a:spcBef>
+                <a:spcPts val="800"/>
+              </a:spcBef>
+              <a:defRPr sz="2400">
+                <a:solidFill>
+                  <a:srgbClr val="202020"/>
+                </a:solidFill>
+              </a:defRPr>
+            </a:pPr>
+            <a:r>
+              <a:t>1. Detection: Locating face bounding box in image frame</a:t>
+            </a:r>
+          </a:p>
+          <a:p>
+            <a:pPr>
+              <a:spcBef>
+                <a:spcPts val="800"/>
+              </a:spcBef>
+              <a:defRPr sz="2400">
+                <a:solidFill>
+                  <a:srgbClr val="202020"/>
+                </a:solidFill>
+              </a:defRPr>
+            </a:pPr>
+            <a:r>
+              <a:t>2. Alignment: Affine/similarity transform to standard template</a:t>
+            </a:r>
+          </a:p>
+          <a:p>
+            <a:pPr>
+              <a:spcBef>
+                <a:spcPts val="800"/>
+              </a:spcBef>
+              <a:defRPr sz="2400">
+                <a:solidFill>
+                  <a:srgbClr val="202020"/>
+                </a:solidFill>
+              </a:defRPr>
+            </a:pPr>
+            <a:r>
+              <a:t>3. Feature Extraction: Map face to 512-D compact vector</a:t>
+            </a:r>
+          </a:p>
+          <a:p>
+            <a:pPr>
+              <a:spcBef>
+                <a:spcPts val="800"/>
+              </a:spcBef>
+              <a:defRPr sz="2400">
+                <a:solidFill>
+                  <a:srgbClr val="202020"/>
+                </a:solidFill>
+              </a:defRPr>
+            </a:pPr>
+            <a:r>
+              <a:t>4. Matching: Cosine similarity; 1:1 verification or 1:N identification</a:t>
             </a:r>
           </a:p>
         </p:txBody>
@@ -5402,7 +7226,7 @@
               </a:defRPr>
             </a:pPr>
             <a:r>
-              <a:t>2. 相关工作：特征学习与损失函数</a:t>
+              <a:t>2. Related Work: Face Detection</a:t>
             </a:r>
           </a:p>
         </p:txBody>
@@ -5431,37 +7255,52 @@
           <a:p>
             <a:pPr>
               <a:spcBef>
-                <a:spcPts val="1200"/>
-              </a:spcBef>
-              <a:defRPr sz="2400">
-                <a:solidFill>
-                  <a:srgbClr val="202020"/>
-                </a:solidFill>
-              </a:defRPr>
-            </a:pPr>
-            <a:r>
-              <a:t>• Triplet Loss (FaceNet)：三元组距离直接学习</a:t>
-            </a:r>
-          </a:p>
-          <a:p>
-            <a:pPr>
-              <a:spcBef>
-                <a:spcPts val="1200"/>
-              </a:spcBef>
-              <a:defRPr sz="2400">
-                <a:solidFill>
-                  <a:srgbClr val="202020"/>
-                </a:solidFill>
-              </a:defRPr>
-            </a:pPr>
-            <a:r>
-              <a:t>• Margin-based Softmax</a:t>
-            </a:r>
-          </a:p>
-          <a:p>
-            <a:pPr lvl="1">
-              <a:spcBef>
-                <a:spcPts val="600"/>
+                <a:spcPts val="800"/>
+              </a:spcBef>
+              <a:defRPr sz="2400">
+                <a:solidFill>
+                  <a:srgbClr val="202020"/>
+                </a:solidFill>
+              </a:defRPr>
+            </a:pPr>
+            <a:r>
+              <a:t>Early: Viola-Jones (Haar features + AdaBoost)</a:t>
+            </a:r>
+          </a:p>
+          <a:p>
+            <a:pPr>
+              <a:spcBef>
+                <a:spcPts val="800"/>
+              </a:spcBef>
+              <a:defRPr sz="2400">
+                <a:solidFill>
+                  <a:srgbClr val="202020"/>
+                </a:solidFill>
+              </a:defRPr>
+            </a:pPr>
+            <a:r>
+              <a:t>Deep Learning: SSD, YOLO adapted for faces</a:t>
+            </a:r>
+          </a:p>
+          <a:p>
+            <a:pPr>
+              <a:spcBef>
+                <a:spcPts val="800"/>
+              </a:spcBef>
+              <a:defRPr sz="2400">
+                <a:solidFill>
+                  <a:srgbClr val="202020"/>
+                </a:solidFill>
+              </a:defRPr>
+            </a:pPr>
+            <a:r>
+              <a:t>MTCNN: Multi-stage framework (P-Net, R-Net, O-Net)</a:t>
+            </a:r>
+          </a:p>
+          <a:p>
+            <a:pPr>
+              <a:spcBef>
+                <a:spcPts val="800"/>
               </a:spcBef>
               <a:defRPr sz="2000">
                 <a:solidFill>
@@ -5470,13 +7309,28 @@
               </a:defRPr>
             </a:pPr>
             <a:r>
-              <a:t>• SphereFace: 角度margin</a:t>
-            </a:r>
-          </a:p>
-          <a:p>
-            <a:pPr lvl="1">
-              <a:spcBef>
-                <a:spcPts val="600"/>
+              <a:t>  - Multiple stages lead to computational overhead</a:t>
+            </a:r>
+          </a:p>
+          <a:p>
+            <a:pPr>
+              <a:spcBef>
+                <a:spcPts val="800"/>
+              </a:spcBef>
+              <a:defRPr sz="2400">
+                <a:solidFill>
+                  <a:srgbClr val="202020"/>
+                </a:solidFill>
+              </a:defRPr>
+            </a:pPr>
+            <a:r>
+              <a:t>RetinaFace: Single-stage multi-task learning</a:t>
+            </a:r>
+          </a:p>
+          <a:p>
+            <a:pPr>
+              <a:spcBef>
+                <a:spcPts val="800"/>
               </a:spcBef>
               <a:defRPr sz="2000">
                 <a:solidFill>
@@ -5485,13 +7339,13 @@
               </a:defRPr>
             </a:pPr>
             <a:r>
-              <a:t>• CosFace: 余弦margin</a:t>
-            </a:r>
-          </a:p>
-          <a:p>
-            <a:pPr lvl="1">
-              <a:spcBef>
-                <a:spcPts val="600"/>
+              <a:t>  - Predicts face scores, bounding boxes, 5 landmarks</a:t>
+            </a:r>
+          </a:p>
+          <a:p>
+            <a:pPr>
+              <a:spcBef>
+                <a:spcPts val="800"/>
               </a:spcBef>
               <a:defRPr sz="2000">
                 <a:solidFill>
@@ -5500,22 +7354,7 @@
               </a:defRPr>
             </a:pPr>
             <a:r>
-              <a:t>• ArcFace: 加法角度margin，几何解释更直观，训练更稳定</a:t>
-            </a:r>
-          </a:p>
-          <a:p>
-            <a:pPr>
-              <a:spcBef>
-                <a:spcPts val="1200"/>
-              </a:spcBef>
-              <a:defRPr sz="2400">
-                <a:solidFill>
-                  <a:srgbClr val="202020"/>
-                </a:solidFill>
-              </a:defRPr>
-            </a:pPr>
-            <a:r>
-              <a:t>• ArcFace推动LFW、MegaFace等榜单SOTA</a:t>
+              <a:t>  - FPN for scale and pose robustness</a:t>
             </a:r>
           </a:p>
         </p:txBody>
@@ -5646,7 +7485,7 @@
               </a:defRPr>
             </a:pPr>
             <a:r>
-              <a:t>2. 相关工作：深度骨干网络与加速</a:t>
+              <a:t>2. Related Work: Loss Functions</a:t>
             </a:r>
           </a:p>
         </p:txBody>
@@ -5675,52 +7514,22 @@
           <a:p>
             <a:pPr>
               <a:spcBef>
-                <a:spcPts val="1200"/>
-              </a:spcBef>
-              <a:defRPr sz="2400">
-                <a:solidFill>
-                  <a:srgbClr val="202020"/>
-                </a:solidFill>
-              </a:defRPr>
-            </a:pPr>
-            <a:r>
-              <a:t>• 高效性骨干：MobileNet、ShuffleNet（移动端）</a:t>
-            </a:r>
-          </a:p>
-          <a:p>
-            <a:pPr>
-              <a:spcBef>
-                <a:spcPts val="1200"/>
-              </a:spcBef>
-              <a:defRPr sz="2400">
-                <a:solidFill>
-                  <a:srgbClr val="202020"/>
-                </a:solidFill>
-              </a:defRPr>
-            </a:pPr>
-            <a:r>
-              <a:t>• 高判别性骨干：ResNet（本项目选用ResNet100）</a:t>
-            </a:r>
-          </a:p>
-          <a:p>
-            <a:pPr>
-              <a:spcBef>
-                <a:spcPts val="1200"/>
-              </a:spcBef>
-              <a:defRPr sz="2400">
-                <a:solidFill>
-                  <a:srgbClr val="202020"/>
-                </a:solidFill>
-              </a:defRPr>
-            </a:pPr>
-            <a:r>
-              <a:t>• Jetson Nano部署挑战</a:t>
-            </a:r>
-          </a:p>
-          <a:p>
-            <a:pPr lvl="1">
-              <a:spcBef>
-                <a:spcPts val="600"/>
+                <a:spcPts val="800"/>
+              </a:spcBef>
+              <a:defRPr sz="2400">
+                <a:solidFill>
+                  <a:srgbClr val="202020"/>
+                </a:solidFill>
+              </a:defRPr>
+            </a:pPr>
+            <a:r>
+              <a:t>Triplet Loss (FaceNet): Direct embedding distance optimization</a:t>
+            </a:r>
+          </a:p>
+          <a:p>
+            <a:pPr>
+              <a:spcBef>
+                <a:spcPts val="800"/>
               </a:spcBef>
               <a:defRPr sz="2000">
                 <a:solidFill>
@@ -5729,13 +7538,28 @@
               </a:defRPr>
             </a:pPr>
             <a:r>
-              <a:t>• ONNX桥接深度学习框架</a:t>
-            </a:r>
-          </a:p>
-          <a:p>
-            <a:pPr lvl="1">
-              <a:spcBef>
-                <a:spcPts val="600"/>
+              <a:t>  - Combinatorial explosion, expensive and unstable training</a:t>
+            </a:r>
+          </a:p>
+          <a:p>
+            <a:pPr>
+              <a:spcBef>
+                <a:spcPts val="800"/>
+              </a:spcBef>
+              <a:defRPr sz="2400">
+                <a:solidFill>
+                  <a:srgbClr val="202020"/>
+                </a:solidFill>
+              </a:defRPr>
+            </a:pPr>
+            <a:r>
+              <a:t>Margin-based Softmax:</a:t>
+            </a:r>
+          </a:p>
+          <a:p>
+            <a:pPr>
+              <a:spcBef>
+                <a:spcPts val="800"/>
               </a:spcBef>
               <a:defRPr sz="2000">
                 <a:solidFill>
@@ -5744,7 +7568,52 @@
               </a:defRPr>
             </a:pPr>
             <a:r>
-              <a:t>• TensorRT自动融合/量化，FP16提升2-3倍速度</a:t>
+              <a:t>  - SphereFace: Multiplicative angular margin</a:t>
+            </a:r>
+          </a:p>
+          <a:p>
+            <a:pPr>
+              <a:spcBef>
+                <a:spcPts val="800"/>
+              </a:spcBef>
+              <a:defRPr sz="2000">
+                <a:solidFill>
+                  <a:srgbClr val="202020"/>
+                </a:solidFill>
+              </a:defRPr>
+            </a:pPr>
+            <a:r>
+              <a:t>  - CosFace: Additive cosine margin</a:t>
+            </a:r>
+          </a:p>
+          <a:p>
+            <a:pPr>
+              <a:spcBef>
+                <a:spcPts val="800"/>
+              </a:spcBef>
+              <a:defRPr sz="2000">
+                <a:solidFill>
+                  <a:srgbClr val="202020"/>
+                </a:solidFill>
+              </a:defRPr>
+            </a:pPr>
+            <a:r>
+              <a:t>  - ArcFace: Additive angular margin</a:t>
+            </a:r>
+          </a:p>
+          <a:p>
+            <a:pPr>
+              <a:spcBef>
+                <a:spcPts val="800"/>
+              </a:spcBef>
+              <a:defRPr sz="2400">
+                <a:solidFill>
+                  <a:srgbClr val="202020"/>
+                </a:solidFill>
+              </a:defRPr>
+            </a:pPr>
+            <a:r>
+              <a:t>ArcFace: Clearer geometry, stable training, SOTA on LFW/MegaFace</a:t>
             </a:r>
           </a:p>
         </p:txBody>
@@ -5875,7 +7744,7 @@
               </a:defRPr>
             </a:pPr>
             <a:r>
-              <a:t>3. InsightFace算法结构</a:t>
+              <a:t>2. Related Work: Backbone &amp; Acceleration</a:t>
             </a:r>
           </a:p>
         </p:txBody>
@@ -5904,46 +7773,106 @@
           <a:p>
             <a:pPr>
               <a:spcBef>
-                <a:spcPts val="1200"/>
-              </a:spcBef>
-              <a:defRPr sz="2400">
-                <a:solidFill>
-                  <a:srgbClr val="202020"/>
-                </a:solidFill>
-              </a:defRPr>
-            </a:pPr>
-            <a:r>
-              <a:t>• 开源人脸识别全流程框架，MIT协议</a:t>
-            </a:r>
-          </a:p>
-          <a:p>
-            <a:pPr>
-              <a:spcBef>
-                <a:spcPts val="1200"/>
-              </a:spcBef>
-              <a:defRPr sz="2400">
-                <a:solidFill>
-                  <a:srgbClr val="202020"/>
-                </a:solidFill>
-              </a:defRPr>
-            </a:pPr>
-            <a:r>
-              <a:t>• 支持人脸检测、关键点对齐、特征提取</a:t>
-            </a:r>
-          </a:p>
-          <a:p>
-            <a:pPr>
-              <a:spcBef>
-                <a:spcPts val="1200"/>
-              </a:spcBef>
-              <a:defRPr sz="2400">
-                <a:solidFill>
-                  <a:srgbClr val="202020"/>
-                </a:solidFill>
-              </a:defRPr>
-            </a:pPr>
-            <a:r>
-              <a:t>• 多模型支持（ArcFace、CosFace等），兼容主流平台</a:t>
+                <a:spcPts val="800"/>
+              </a:spcBef>
+              <a:defRPr sz="2400">
+                <a:solidFill>
+                  <a:srgbClr val="202020"/>
+                </a:solidFill>
+              </a:defRPr>
+            </a:pPr>
+            <a:r>
+              <a:t>Lightweight: MobileNet, ShuffleNet (mobile efficiency)</a:t>
+            </a:r>
+          </a:p>
+          <a:p>
+            <a:pPr>
+              <a:spcBef>
+                <a:spcPts val="800"/>
+              </a:spcBef>
+              <a:defRPr sz="2400">
+                <a:solidFill>
+                  <a:srgbClr val="202020"/>
+                </a:solidFill>
+              </a:defRPr>
+            </a:pPr>
+            <a:r>
+              <a:t>High discriminability: ResNet (residual connections)</a:t>
+            </a:r>
+          </a:p>
+          <a:p>
+            <a:pPr>
+              <a:spcBef>
+                <a:spcPts val="800"/>
+              </a:spcBef>
+              <a:defRPr sz="2400">
+                <a:solidFill>
+                  <a:srgbClr val="202020"/>
+                </a:solidFill>
+              </a:defRPr>
+            </a:pPr>
+            <a:r>
+              <a:t>This project: ResNet100 for maximum discriminability</a:t>
+            </a:r>
+          </a:p>
+          <a:p>
+            <a:pPr>
+              <a:spcBef>
+                <a:spcPts val="800"/>
+              </a:spcBef>
+              <a:defRPr sz="2400">
+                <a:solidFill>
+                  <a:srgbClr val="202020"/>
+                </a:solidFill>
+              </a:defRPr>
+            </a:pPr>
+            <a:r>
+              <a:t>Jetson Nano (128-core Maxwell GPU):</a:t>
+            </a:r>
+          </a:p>
+          <a:p>
+            <a:pPr>
+              <a:spcBef>
+                <a:spcPts val="800"/>
+              </a:spcBef>
+              <a:defRPr sz="2000">
+                <a:solidFill>
+                  <a:srgbClr val="202020"/>
+                </a:solidFill>
+              </a:defRPr>
+            </a:pPr>
+            <a:r>
+              <a:t>  - ONNX: Cross-platform intermediate representation</a:t>
+            </a:r>
+          </a:p>
+          <a:p>
+            <a:pPr>
+              <a:spcBef>
+                <a:spcPts val="800"/>
+              </a:spcBef>
+              <a:defRPr sz="2000">
+                <a:solidFill>
+                  <a:srgbClr val="202020"/>
+                </a:solidFill>
+              </a:defRPr>
+            </a:pPr>
+            <a:r>
+              <a:t>  - TensorRT: Layer Fusion + Precision Calibration</a:t>
+            </a:r>
+          </a:p>
+          <a:p>
+            <a:pPr>
+              <a:spcBef>
+                <a:spcPts val="800"/>
+              </a:spcBef>
+              <a:defRPr sz="2000">
+                <a:solidFill>
+                  <a:srgbClr val="202020"/>
+                </a:solidFill>
+              </a:defRPr>
+            </a:pPr>
+            <a:r>
+              <a:t>  - FP16: 2-3x speedup vs FP32</a:t>
             </a:r>
           </a:p>
         </p:txBody>
@@ -6074,7 +8003,7 @@
               </a:defRPr>
             </a:pPr>
             <a:r>
-              <a:t>人脸识别典型流程</a:t>
+              <a:t>3. InsightFace Framework</a:t>
             </a:r>
           </a:p>
         </p:txBody>
@@ -6103,91 +8032,106 @@
           <a:p>
             <a:pPr>
               <a:spcBef>
-                <a:spcPts val="1200"/>
-              </a:spcBef>
-              <a:defRPr sz="2400">
-                <a:solidFill>
-                  <a:srgbClr val="202020"/>
-                </a:solidFill>
-              </a:defRPr>
-            </a:pPr>
-            <a:r>
-              <a:t>• 检测 → 框/关键点</a:t>
-            </a:r>
-          </a:p>
-          <a:p>
-            <a:pPr>
-              <a:spcBef>
-                <a:spcPts val="1200"/>
-              </a:spcBef>
-              <a:defRPr sz="2400">
-                <a:solidFill>
-                  <a:srgbClr val="202020"/>
-                </a:solidFill>
-              </a:defRPr>
-            </a:pPr>
-            <a:r>
-              <a:t>• 对齐</a:t>
-            </a:r>
-          </a:p>
-          <a:p>
-            <a:pPr>
-              <a:spcBef>
-                <a:spcPts val="1200"/>
-              </a:spcBef>
-              <a:defRPr sz="2400">
-                <a:solidFill>
-                  <a:srgbClr val="202020"/>
-                </a:solidFill>
-              </a:defRPr>
-            </a:pPr>
-            <a:r>
-              <a:t>• 特征提取</a:t>
-            </a:r>
-          </a:p>
-          <a:p>
-            <a:pPr>
-              <a:spcBef>
-                <a:spcPts val="1200"/>
-              </a:spcBef>
-              <a:defRPr sz="2400">
-                <a:solidFill>
-                  <a:srgbClr val="202020"/>
-                </a:solidFill>
-              </a:defRPr>
-            </a:pPr>
-            <a:r>
-              <a:t>• 检索/识别</a:t>
-            </a:r>
-          </a:p>
-          <a:p>
-            <a:pPr>
-              <a:spcBef>
-                <a:spcPts val="1200"/>
-              </a:spcBef>
-              <a:defRPr sz="2400">
-                <a:solidFill>
-                  <a:srgbClr val="202020"/>
-                </a:solidFill>
-              </a:defRPr>
-            </a:pPr>
-            <a:r>
-              <a:t>• </a:t>
-            </a:r>
-          </a:p>
-          <a:p>
-            <a:pPr>
-              <a:spcBef>
-                <a:spcPts val="1200"/>
-              </a:spcBef>
-              <a:defRPr sz="2400">
-                <a:solidFill>
-                  <a:srgbClr val="202020"/>
-                </a:solidFill>
-              </a:defRPr>
-            </a:pPr>
-            <a:r>
-              <a:t>• Pipeline: Detection → Alignment → Feature Extraction → Recognition</a:t>
+                <a:spcPts val="800"/>
+              </a:spcBef>
+              <a:defRPr sz="2400">
+                <a:solidFill>
+                  <a:srgbClr val="202020"/>
+                </a:solidFill>
+              </a:defRPr>
+            </a:pPr>
+            <a:r>
+              <a:t>Open-source 2D/3D face analysis toolbox (MIT license)</a:t>
+            </a:r>
+          </a:p>
+          <a:p>
+            <a:pPr>
+              <a:spcBef>
+                <a:spcPts val="800"/>
+              </a:spcBef>
+              <a:defRPr sz="2400">
+                <a:solidFill>
+                  <a:srgbClr val="202020"/>
+                </a:solidFill>
+              </a:defRPr>
+            </a:pPr>
+            <a:r>
+              <a:t>SOTA algorithms: ArcFace, CosFace, etc.</a:t>
+            </a:r>
+          </a:p>
+          <a:p>
+            <a:pPr>
+              <a:spcBef>
+                <a:spcPts val="800"/>
+              </a:spcBef>
+              <a:defRPr sz="2400">
+                <a:solidFill>
+                  <a:srgbClr val="202020"/>
+                </a:solidFill>
+              </a:defRPr>
+            </a:pPr>
+            <a:r>
+              <a:t>Compatible: Python 3.x, PyTorch, MXNet</a:t>
+            </a:r>
+          </a:p>
+          <a:p>
+            <a:pPr>
+              <a:spcBef>
+                <a:spcPts val="800"/>
+              </a:spcBef>
+              <a:defRPr sz="2400">
+                <a:solidFill>
+                  <a:srgbClr val="202020"/>
+                </a:solidFill>
+              </a:defRPr>
+            </a:pPr>
+            <a:r>
+              <a:t>Efficient on CPUs, GPUs, mobile devices</a:t>
+            </a:r>
+          </a:p>
+          <a:p>
+            <a:pPr>
+              <a:spcBef>
+                <a:spcPts val="800"/>
+              </a:spcBef>
+              <a:defRPr sz="2400">
+                <a:solidFill>
+                  <a:srgbClr val="202020"/>
+                </a:solidFill>
+              </a:defRPr>
+            </a:pPr>
+            <a:r>
+              <a:t>Applications:</a:t>
+            </a:r>
+          </a:p>
+          <a:p>
+            <a:pPr>
+              <a:spcBef>
+                <a:spcPts val="800"/>
+              </a:spcBef>
+              <a:defRPr sz="2000">
+                <a:solidFill>
+                  <a:srgbClr val="202020"/>
+                </a:solidFill>
+              </a:defRPr>
+            </a:pPr>
+            <a:r>
+              <a:t>  - Biometric security, smart surveillance</a:t>
+            </a:r>
+          </a:p>
+          <a:p>
+            <a:pPr>
+              <a:spcBef>
+                <a:spcPts val="800"/>
+              </a:spcBef>
+              <a:defRPr sz="2000">
+                <a:solidFill>
+                  <a:srgbClr val="202020"/>
+                </a:solidFill>
+              </a:defRPr>
+            </a:pPr>
+            <a:r>
+              <a:t>  - Social media photo sorting</a:t>
             </a:r>
           </a:p>
         </p:txBody>
@@ -6318,7 +8262,7 @@
               </a:defRPr>
             </a:pPr>
             <a:r>
-              <a:t>Face Detection: RetinaFace</a:t>
+              <a:t>4. Face Detection: RetinaFace</a:t>
             </a:r>
           </a:p>
         </p:txBody>
@@ -6347,76 +8291,106 @@
           <a:p>
             <a:pPr>
               <a:spcBef>
-                <a:spcPts val="1200"/>
-              </a:spcBef>
-              <a:defRPr sz="2400">
-                <a:solidFill>
-                  <a:srgbClr val="202020"/>
-                </a:solidFill>
-              </a:defRPr>
-            </a:pPr>
-            <a:r>
-              <a:t>• 单阶段多任务检测器，预测框+置信度+关键点</a:t>
-            </a:r>
-          </a:p>
-          <a:p>
-            <a:pPr>
-              <a:spcBef>
-                <a:spcPts val="1200"/>
-              </a:spcBef>
-              <a:defRPr sz="2400">
-                <a:solidFill>
-                  <a:srgbClr val="202020"/>
-                </a:solidFill>
-              </a:defRPr>
-            </a:pPr>
-            <a:r>
-              <a:t>• 多尺度FPN特征，Dense预测</a:t>
-            </a:r>
-          </a:p>
-          <a:p>
-            <a:pPr>
-              <a:spcBef>
-                <a:spcPts val="1200"/>
-              </a:spcBef>
-              <a:defRPr sz="2400">
-                <a:solidFill>
-                  <a:srgbClr val="202020"/>
-                </a:solidFill>
-              </a:defRPr>
-            </a:pPr>
-            <a:r>
-              <a:t>• 损失函数 = 分类 + 回归 + 关键点，焦点损失抵抗类别失衡</a:t>
-            </a:r>
-          </a:p>
-          <a:p>
-            <a:pPr>
-              <a:spcBef>
-                <a:spcPts val="1200"/>
-              </a:spcBef>
-              <a:defRPr sz="2400">
-                <a:solidFill>
-                  <a:srgbClr val="202020"/>
-                </a:solidFill>
-              </a:defRPr>
-            </a:pPr>
-            <a:r>
-              <a:t>• 推理阶段IoU并NMS合并</a:t>
-            </a:r>
-          </a:p>
-          <a:p>
-            <a:pPr>
-              <a:spcBef>
-                <a:spcPts val="1200"/>
-              </a:spcBef>
-              <a:defRPr sz="2400">
-                <a:solidFill>
-                  <a:srgbClr val="202020"/>
-                </a:solidFill>
-              </a:defRPr>
-            </a:pPr>
-            <a:r>
-              <a:t>• RetinaFace vs. SCRFD: 前者注重定位和关键点，后者极致效率</a:t>
+                <a:spcPts val="800"/>
+              </a:spcBef>
+              <a:defRPr sz="2400">
+                <a:solidFill>
+                  <a:srgbClr val="202020"/>
+                </a:solidFill>
+              </a:defRPr>
+            </a:pPr>
+            <a:r>
+              <a:t>Single-stage multi-task detector with feature pyramid {F_l}</a:t>
+            </a:r>
+          </a:p>
+          <a:p>
+            <a:pPr>
+              <a:spcBef>
+                <a:spcPts val="800"/>
+              </a:spcBef>
+              <a:defRPr sz="2400">
+                <a:solidFill>
+                  <a:srgbClr val="202020"/>
+                </a:solidFill>
+              </a:defRPr>
+            </a:pPr>
+            <a:r>
+              <a:t>Anchor-based: predicts offsets t=(t_x, t_y, t_w, t_h)</a:t>
+            </a:r>
+          </a:p>
+          <a:p>
+            <a:pPr>
+              <a:spcBef>
+                <a:spcPts val="800"/>
+              </a:spcBef>
+              <a:defRPr sz="2000">
+                <a:solidFill>
+                  <a:srgbClr val="202020"/>
+                </a:solidFill>
+              </a:defRPr>
+            </a:pPr>
+            <a:r>
+              <a:t>  - x = x_a + t_x*w_a, w = w_a*exp(t_w)</a:t>
+            </a:r>
+          </a:p>
+          <a:p>
+            <a:pPr>
+              <a:spcBef>
+                <a:spcPts val="800"/>
+              </a:spcBef>
+              <a:defRPr sz="2400">
+                <a:solidFill>
+                  <a:srgbClr val="202020"/>
+                </a:solidFill>
+              </a:defRPr>
+            </a:pPr>
+            <a:r>
+              <a:t>Landmark: K=5 keypoints with normalized offsets</a:t>
+            </a:r>
+          </a:p>
+          <a:p>
+            <a:pPr>
+              <a:spcBef>
+                <a:spcPts val="800"/>
+              </a:spcBef>
+              <a:defRPr sz="2400">
+                <a:solidFill>
+                  <a:srgbClr val="202020"/>
+                </a:solidFill>
+              </a:defRPr>
+            </a:pPr>
+            <a:r>
+              <a:t>Multi-task loss:</a:t>
+            </a:r>
+          </a:p>
+          <a:p>
+            <a:pPr>
+              <a:spcBef>
+                <a:spcPts val="800"/>
+              </a:spcBef>
+              <a:defRPr sz="2000">
+                <a:solidFill>
+                  <a:srgbClr val="202020"/>
+                </a:solidFill>
+              </a:defRPr>
+            </a:pPr>
+            <a:r>
+              <a:t>  - L = lambda_cls*L_cls + lambda_box*L_box + lambda_kps*L_kps</a:t>
+            </a:r>
+          </a:p>
+          <a:p>
+            <a:pPr>
+              <a:spcBef>
+                <a:spcPts val="800"/>
+              </a:spcBef>
+              <a:defRPr sz="2400">
+                <a:solidFill>
+                  <a:srgbClr val="202020"/>
+                </a:solidFill>
+              </a:defRPr>
+            </a:pPr>
+            <a:r>
+              <a:t>Focal Loss handles class imbalance</a:t>
             </a:r>
           </a:p>
         </p:txBody>

</xml_diff>